<commit_message>
Adding slide to animation
</commit_message>
<xml_diff>
--- a/MultiThreading/!Materials/Multithreading - Animation.pptx
+++ b/MultiThreading/!Materials/Multithreading - Animation.pptx
@@ -106,7 +106,38 @@
       </a:defRPr>
     </a:lvl9pPr>
   </p:defaultTextStyle>
+  <p:extLst>
+    <p:ext uri="{EFAFB233-063F-42B5-8137-9DF3F51BA10A}">
+      <p15:sldGuideLst xmlns:p15="http://schemas.microsoft.com/office/powerpoint/2012/main"/>
+    </p:ext>
+  </p:extLst>
 </p:presentation>
+</file>
+
+<file path=ppt/commentAuthors.xml><?xml version="1.0" encoding="utf-8"?>
+<p:cmAuthorLst xmlns:a="http://schemas.openxmlformats.org/drawingml/2006/main" xmlns:r="http://schemas.openxmlformats.org/officeDocument/2006/relationships" xmlns:p="http://schemas.openxmlformats.org/presentationml/2006/main">
+  <p:cmAuthor id="1" name="Eugene Ryzhov" initials="ER" lastIdx="1" clrIdx="0">
+    <p:extLst>
+      <p:ext uri="{19B8F6BF-5375-455C-9EA6-DF929625EA0E}">
+        <p15:presenceInfo xmlns:p15="http://schemas.microsoft.com/office/powerpoint/2012/main" userId="65115747cbe35871" providerId="Windows Live"/>
+      </p:ext>
+    </p:extLst>
+  </p:cmAuthor>
+</p:cmAuthorLst>
+</file>
+
+<file path=ppt/comments/comment1.xml><?xml version="1.0" encoding="utf-8"?>
+<p:cmLst xmlns:a="http://schemas.openxmlformats.org/drawingml/2006/main" xmlns:r="http://schemas.openxmlformats.org/officeDocument/2006/relationships" xmlns:p="http://schemas.openxmlformats.org/presentationml/2006/main">
+  <p:cm authorId="1" dt="2020-12-14T18:48:52.071" idx="1">
+    <p:pos x="6679" y="1926"/>
+    <p:text/>
+    <p:extLst>
+      <p:ext uri="{C676402C-5697-4E1C-873F-D02D1690AC5C}">
+        <p15:threadingInfo xmlns:p15="http://schemas.microsoft.com/office/powerpoint/2012/main" timeZoneBias="-60"/>
+      </p:ext>
+    </p:extLst>
+  </p:cm>
+</p:cmLst>
 </file>
 
 <file path=ppt/slideLayouts/slideLayout1.xml><?xml version="1.0" encoding="utf-8"?>
@@ -3821,8 +3852,8 @@
         </p:nvSpPr>
         <p:spPr>
           <a:xfrm>
-            <a:off x="804672" y="962246"/>
-            <a:ext cx="6437700" cy="2611967"/>
+            <a:off x="4618493" y="2918313"/>
+            <a:ext cx="6437700" cy="1018050"/>
           </a:xfrm>
         </p:spPr>
         <p:txBody>
@@ -3833,13 +3864,48 @@
           <a:p>
             <a:pPr algn="l"/>
             <a:r>
-              <a:rPr lang="en-US" sz="5400"/>
-              <a:t>C#: Mulithreading</a:t>
-            </a:r>
-            <a:endParaRPr lang="pl-PL" sz="5400"/>
-          </a:p>
-        </p:txBody>
-      </p:sp>
+              <a:rPr lang="pl-PL" sz="6400" b="1" dirty="0"/>
+              <a:t>MULTITHREADING</a:t>
+            </a:r>
+          </a:p>
+        </p:txBody>
+      </p:sp>
+      <p:pic>
+        <p:nvPicPr>
+          <p:cNvPr id="4" name="Picture 3">
+            <a:extLst>
+              <a:ext uri="{FF2B5EF4-FFF2-40B4-BE49-F238E27FC236}">
+                <a16:creationId xmlns:a16="http://schemas.microsoft.com/office/drawing/2014/main" id="{D59876AD-1F77-4E19-B0C3-F83F380BF0A1}"/>
+              </a:ext>
+            </a:extLst>
+          </p:cNvPr>
+          <p:cNvPicPr>
+            <a:picLocks noChangeAspect="1"/>
+          </p:cNvPicPr>
+          <p:nvPr/>
+        </p:nvPicPr>
+        <p:blipFill>
+          <a:blip r:embed="rId2">
+            <a:extLst>
+              <a:ext uri="{28A0092B-C50C-407E-A947-70E740481C1C}">
+                <a14:useLocalDpi xmlns:a14="http://schemas.microsoft.com/office/drawing/2010/main" val="0"/>
+              </a:ext>
+            </a:extLst>
+          </a:blip>
+          <a:stretch>
+            <a:fillRect/>
+          </a:stretch>
+        </p:blipFill>
+        <p:spPr>
+          <a:xfrm>
+            <a:off x="1152524" y="1712838"/>
+            <a:ext cx="3429000" cy="3429000"/>
+          </a:xfrm>
+          <a:prstGeom prst="rect">
+            <a:avLst/>
+          </a:prstGeom>
+        </p:spPr>
+      </p:pic>
     </p:spTree>
     <p:extLst>
       <p:ext uri="{BB962C8B-B14F-4D97-AF65-F5344CB8AC3E}">
@@ -3850,6 +3916,137 @@
   <p:clrMapOvr>
     <a:overrideClrMapping bg1="dk1" tx1="lt1" bg2="dk2" tx2="lt2" accent1="accent1" accent2="accent2" accent3="accent3" accent4="accent4" accent5="accent5" accent6="accent6" hlink="hlink" folHlink="folHlink"/>
   </p:clrMapOvr>
+  <p:timing>
+    <p:tnLst>
+      <p:par>
+        <p:cTn id="1" dur="indefinite" restart="never" nodeType="tmRoot">
+          <p:childTnLst>
+            <p:seq concurrent="1" nextAc="seek">
+              <p:cTn id="2" dur="indefinite" nodeType="mainSeq">
+                <p:childTnLst>
+                  <p:par>
+                    <p:cTn id="3" fill="hold">
+                      <p:stCondLst>
+                        <p:cond delay="indefinite"/>
+                      </p:stCondLst>
+                      <p:childTnLst>
+                        <p:par>
+                          <p:cTn id="4" fill="hold">
+                            <p:stCondLst>
+                              <p:cond delay="0"/>
+                            </p:stCondLst>
+                            <p:childTnLst>
+                              <p:par>
+                                <p:cTn id="5" presetID="1" presetClass="entr" presetSubtype="0" fill="hold" nodeType="clickEffect">
+                                  <p:stCondLst>
+                                    <p:cond delay="0"/>
+                                  </p:stCondLst>
+                                  <p:childTnLst>
+                                    <p:set>
+                                      <p:cBhvr>
+                                        <p:cTn id="6" dur="1" fill="hold">
+                                          <p:stCondLst>
+                                            <p:cond delay="0"/>
+                                          </p:stCondLst>
+                                        </p:cTn>
+                                        <p:tgtEl>
+                                          <p:spTgt spid="4"/>
+                                        </p:tgtEl>
+                                        <p:attrNameLst>
+                                          <p:attrName>style.visibility</p:attrName>
+                                        </p:attrNameLst>
+                                      </p:cBhvr>
+                                      <p:to>
+                                        <p:strVal val="visible"/>
+                                      </p:to>
+                                    </p:set>
+                                  </p:childTnLst>
+                                </p:cTn>
+                              </p:par>
+                            </p:childTnLst>
+                          </p:cTn>
+                        </p:par>
+                      </p:childTnLst>
+                    </p:cTn>
+                  </p:par>
+                  <p:par>
+                    <p:cTn id="7" fill="hold">
+                      <p:stCondLst>
+                        <p:cond delay="indefinite"/>
+                      </p:stCondLst>
+                      <p:childTnLst>
+                        <p:par>
+                          <p:cTn id="8" fill="hold">
+                            <p:stCondLst>
+                              <p:cond delay="0"/>
+                            </p:stCondLst>
+                            <p:childTnLst>
+                              <p:par>
+                                <p:cTn id="9" presetID="10" presetClass="entr" presetSubtype="0" fill="hold" grpId="0" nodeType="clickEffect">
+                                  <p:stCondLst>
+                                    <p:cond delay="0"/>
+                                  </p:stCondLst>
+                                  <p:childTnLst>
+                                    <p:set>
+                                      <p:cBhvr>
+                                        <p:cTn id="10" dur="1" fill="hold">
+                                          <p:stCondLst>
+                                            <p:cond delay="0"/>
+                                          </p:stCondLst>
+                                        </p:cTn>
+                                        <p:tgtEl>
+                                          <p:spTgt spid="2"/>
+                                        </p:tgtEl>
+                                        <p:attrNameLst>
+                                          <p:attrName>style.visibility</p:attrName>
+                                        </p:attrNameLst>
+                                      </p:cBhvr>
+                                      <p:to>
+                                        <p:strVal val="visible"/>
+                                      </p:to>
+                                    </p:set>
+                                    <p:animEffect transition="in" filter="fade">
+                                      <p:cBhvr>
+                                        <p:cTn id="11" dur="500"/>
+                                        <p:tgtEl>
+                                          <p:spTgt spid="2"/>
+                                        </p:tgtEl>
+                                      </p:cBhvr>
+                                    </p:animEffect>
+                                  </p:childTnLst>
+                                </p:cTn>
+                              </p:par>
+                            </p:childTnLst>
+                          </p:cTn>
+                        </p:par>
+                      </p:childTnLst>
+                    </p:cTn>
+                  </p:par>
+                </p:childTnLst>
+              </p:cTn>
+              <p:prevCondLst>
+                <p:cond evt="onPrev" delay="0">
+                  <p:tgtEl>
+                    <p:sldTgt/>
+                  </p:tgtEl>
+                </p:cond>
+              </p:prevCondLst>
+              <p:nextCondLst>
+                <p:cond evt="onNext" delay="0">
+                  <p:tgtEl>
+                    <p:sldTgt/>
+                  </p:tgtEl>
+                </p:cond>
+              </p:nextCondLst>
+            </p:seq>
+          </p:childTnLst>
+        </p:cTn>
+      </p:par>
+    </p:tnLst>
+    <p:bldLst>
+      <p:bldP spid="2" grpId="0"/>
+    </p:bldLst>
+  </p:timing>
 </p:sld>
 </file>
 
@@ -5575,14 +5772,14 @@
           <p:nvPr>
             <p:extLst>
               <p:ext uri="{D42A27DB-BD31-4B8C-83A1-F6EECF244321}">
-                <p14:modId xmlns:p14="http://schemas.microsoft.com/office/powerpoint/2010/main" val="3925923022"/>
+                <p14:modId xmlns:p14="http://schemas.microsoft.com/office/powerpoint/2010/main" val="1139674945"/>
               </p:ext>
             </p:extLst>
           </p:nvPr>
         </p:nvGraphicFramePr>
         <p:xfrm>
-          <a:off x="1232928" y="3022605"/>
-          <a:ext cx="4218410" cy="2966720"/>
+          <a:off x="1426569" y="3022092"/>
+          <a:ext cx="1187322" cy="2966720"/>
         </p:xfrm>
         <a:graphic>
           <a:graphicData uri="http://schemas.openxmlformats.org/drawingml/2006/table">
@@ -5591,7 +5788,7 @@
                 <a:tableStyleId>{073A0DAA-6AF3-43AB-8588-CEC1D06C72B9}</a:tableStyleId>
               </a:tblPr>
               <a:tblGrid>
-                <a:gridCol w="4218410">
+                <a:gridCol w="1187322">
                   <a:extLst>
                     <a:ext uri="{9D8B030D-6E8A-4147-A177-3AD203B41FA5}">
                       <a16:colId xmlns:a16="http://schemas.microsoft.com/office/drawing/2014/main" val="165492483"/>
@@ -5627,14 +5824,6 @@
                     <a:bodyPr/>
                     <a:lstStyle/>
                     <a:p>
-                      <a:r>
-                        <a:rPr lang="en-US" dirty="0" err="1"/>
-                        <a:t>Console.WriteLine</a:t>
-                      </a:r>
-                      <a:r>
-                        <a:rPr lang="en-US" dirty="0"/>
-                        <a:t>(“Print Something”);</a:t>
-                      </a:r>
                       <a:endParaRPr lang="pl-PL" dirty="0"/>
                     </a:p>
                   </a:txBody>
@@ -5652,18 +5841,6 @@
                     <a:bodyPr/>
                     <a:lstStyle/>
                     <a:p>
-                      <a:r>
-                        <a:rPr lang="en-US" dirty="0"/>
-                        <a:t>int </a:t>
-                      </a:r>
-                      <a:r>
-                        <a:rPr lang="en-US" dirty="0" err="1"/>
-                        <a:t>i</a:t>
-                      </a:r>
-                      <a:r>
-                        <a:rPr lang="en-US" dirty="0"/>
-                        <a:t> = 10;</a:t>
-                      </a:r>
                       <a:endParaRPr lang="pl-PL" dirty="0"/>
                     </a:p>
                   </a:txBody>
@@ -5681,18 +5858,6 @@
                     <a:bodyPr/>
                     <a:lstStyle/>
                     <a:p>
-                      <a:r>
-                        <a:rPr lang="en-US" dirty="0"/>
-                        <a:t>i = </a:t>
-                      </a:r>
-                      <a:r>
-                        <a:rPr lang="en-US" dirty="0" err="1"/>
-                        <a:t>i</a:t>
-                      </a:r>
-                      <a:r>
-                        <a:rPr lang="en-US" dirty="0"/>
-                        <a:t> + 1;</a:t>
-                      </a:r>
                       <a:endParaRPr lang="pl-PL" dirty="0"/>
                     </a:p>
                   </a:txBody>
@@ -5710,22 +5875,6 @@
                     <a:bodyPr/>
                     <a:lstStyle/>
                     <a:p>
-                      <a:r>
-                        <a:rPr lang="en-US" dirty="0" err="1"/>
-                        <a:t>i</a:t>
-                      </a:r>
-                      <a:r>
-                        <a:rPr lang="en-US" dirty="0"/>
-                        <a:t> = </a:t>
-                      </a:r>
-                      <a:r>
-                        <a:rPr lang="en-US" dirty="0" err="1"/>
-                        <a:t>i</a:t>
-                      </a:r>
-                      <a:r>
-                        <a:rPr lang="en-US" dirty="0"/>
-                        <a:t> + 2;</a:t>
-                      </a:r>
                       <a:endParaRPr lang="pl-PL" dirty="0"/>
                     </a:p>
                   </a:txBody>
@@ -5743,30 +5892,6 @@
                     <a:bodyPr/>
                     <a:lstStyle/>
                     <a:p>
-                      <a:r>
-                        <a:rPr lang="en-US" dirty="0" err="1"/>
-                        <a:t>Console.WriteLine</a:t>
-                      </a:r>
-                      <a:r>
-                        <a:rPr lang="en-US" dirty="0"/>
-                        <a:t>($”Current value </a:t>
-                      </a:r>
-                      <a:r>
-                        <a:rPr lang="en-US" dirty="0" err="1"/>
-                        <a:t>i</a:t>
-                      </a:r>
-                      <a:r>
-                        <a:rPr lang="en-US" dirty="0"/>
-                        <a:t> = {</a:t>
-                      </a:r>
-                      <a:r>
-                        <a:rPr lang="en-US" dirty="0" err="1"/>
-                        <a:t>i</a:t>
-                      </a:r>
-                      <a:r>
-                        <a:rPr lang="en-US" dirty="0"/>
-                        <a:t>}”);</a:t>
-                      </a:r>
                       <a:endParaRPr lang="pl-PL" dirty="0"/>
                     </a:p>
                   </a:txBody>
@@ -5784,14 +5909,6 @@
                     <a:bodyPr/>
                     <a:lstStyle/>
                     <a:p>
-                      <a:r>
-                        <a:rPr lang="en-US" dirty="0" err="1"/>
-                        <a:t>i</a:t>
-                      </a:r>
-                      <a:r>
-                        <a:rPr lang="en-US" dirty="0"/>
-                        <a:t> *= 10;</a:t>
-                      </a:r>
                       <a:endParaRPr lang="pl-PL" dirty="0"/>
                     </a:p>
                   </a:txBody>
@@ -5809,10 +5926,6 @@
                     <a:bodyPr/>
                     <a:lstStyle/>
                     <a:p>
-                      <a:r>
-                        <a:rPr lang="en-US" dirty="0"/>
-                        <a:t>…</a:t>
-                      </a:r>
                       <a:endParaRPr lang="pl-PL" dirty="0"/>
                     </a:p>
                   </a:txBody>
@@ -5828,324 +5941,6 @@
           </a:graphicData>
         </a:graphic>
       </p:graphicFrame>
-      <p:graphicFrame>
-        <p:nvGraphicFramePr>
-          <p:cNvPr id="11" name="Table 4">
-            <a:extLst>
-              <a:ext uri="{FF2B5EF4-FFF2-40B4-BE49-F238E27FC236}">
-                <a16:creationId xmlns:a16="http://schemas.microsoft.com/office/drawing/2014/main" id="{2AF95201-DDC1-46AB-B60E-3FB6EF5F37E5}"/>
-              </a:ext>
-            </a:extLst>
-          </p:cNvPr>
-          <p:cNvGraphicFramePr>
-            <a:graphicFrameLocks noGrp="1"/>
-          </p:cNvGraphicFramePr>
-          <p:nvPr>
-            <p:extLst>
-              <p:ext uri="{D42A27DB-BD31-4B8C-83A1-F6EECF244321}">
-                <p14:modId xmlns:p14="http://schemas.microsoft.com/office/powerpoint/2010/main" val="3796690763"/>
-              </p:ext>
-            </p:extLst>
-          </p:nvPr>
-        </p:nvGraphicFramePr>
-        <p:xfrm>
-          <a:off x="6596478" y="3022092"/>
-          <a:ext cx="4218410" cy="2966720"/>
-        </p:xfrm>
-        <a:graphic>
-          <a:graphicData uri="http://schemas.openxmlformats.org/drawingml/2006/table">
-            <a:tbl>
-              <a:tblPr firstRow="1" bandRow="1">
-                <a:tableStyleId>{073A0DAA-6AF3-43AB-8588-CEC1D06C72B9}</a:tableStyleId>
-              </a:tblPr>
-              <a:tblGrid>
-                <a:gridCol w="4218410">
-                  <a:extLst>
-                    <a:ext uri="{9D8B030D-6E8A-4147-A177-3AD203B41FA5}">
-                      <a16:colId xmlns:a16="http://schemas.microsoft.com/office/drawing/2014/main" val="165492483"/>
-                    </a:ext>
-                  </a:extLst>
-                </a:gridCol>
-              </a:tblGrid>
-              <a:tr h="370840">
-                <a:tc>
-                  <a:txBody>
-                    <a:bodyPr/>
-                    <a:lstStyle/>
-                    <a:p>
-                      <a:pPr algn="ctr"/>
-                      <a:r>
-                        <a:rPr lang="en-US" dirty="0"/>
-                        <a:t>Thread 2</a:t>
-                      </a:r>
-                      <a:endParaRPr lang="pl-PL" dirty="0"/>
-                    </a:p>
-                  </a:txBody>
-                  <a:tcPr/>
-                </a:tc>
-                <a:extLst>
-                  <a:ext uri="{0D108BD9-81ED-4DB2-BD59-A6C34878D82A}">
-                    <a16:rowId xmlns:a16="http://schemas.microsoft.com/office/drawing/2014/main" val="2771007643"/>
-                  </a:ext>
-                </a:extLst>
-              </a:tr>
-              <a:tr h="370840">
-                <a:tc>
-                  <a:txBody>
-                    <a:bodyPr/>
-                    <a:lstStyle/>
-                    <a:p>
-                      <a:r>
-                        <a:rPr lang="en-US" dirty="0"/>
-                        <a:t>String </a:t>
-                      </a:r>
-                      <a:r>
-                        <a:rPr lang="en-US" dirty="0" err="1"/>
-                        <a:t>fname</a:t>
-                      </a:r>
-                      <a:r>
-                        <a:rPr lang="en-US" dirty="0"/>
-                        <a:t> = </a:t>
-                      </a:r>
-                      <a:r>
-                        <a:rPr lang="en-US" dirty="0" err="1"/>
-                        <a:t>Console.ReadLine</a:t>
-                      </a:r>
-                      <a:r>
-                        <a:rPr lang="en-US" dirty="0"/>
-                        <a:t>();</a:t>
-                      </a:r>
-                      <a:endParaRPr lang="pl-PL" dirty="0"/>
-                    </a:p>
-                  </a:txBody>
-                  <a:tcPr/>
-                </a:tc>
-                <a:extLst>
-                  <a:ext uri="{0D108BD9-81ED-4DB2-BD59-A6C34878D82A}">
-                    <a16:rowId xmlns:a16="http://schemas.microsoft.com/office/drawing/2014/main" val="983031422"/>
-                  </a:ext>
-                </a:extLst>
-              </a:tr>
-              <a:tr h="370840">
-                <a:tc>
-                  <a:txBody>
-                    <a:bodyPr/>
-                    <a:lstStyle/>
-                    <a:p>
-                      <a:r>
-                        <a:rPr lang="en-US" dirty="0" err="1"/>
-                        <a:t>Console.WriteLine</a:t>
-                      </a:r>
-                      <a:r>
-                        <a:rPr lang="en-US" dirty="0"/>
-                        <a:t>($”First: {</a:t>
-                      </a:r>
-                      <a:r>
-                        <a:rPr lang="en-US" dirty="0" err="1"/>
-                        <a:t>fname</a:t>
-                      </a:r>
-                      <a:r>
-                        <a:rPr lang="en-US" dirty="0"/>
-                        <a:t>}”);</a:t>
-                      </a:r>
-                      <a:endParaRPr lang="pl-PL" dirty="0"/>
-                    </a:p>
-                  </a:txBody>
-                  <a:tcPr/>
-                </a:tc>
-                <a:extLst>
-                  <a:ext uri="{0D108BD9-81ED-4DB2-BD59-A6C34878D82A}">
-                    <a16:rowId xmlns:a16="http://schemas.microsoft.com/office/drawing/2014/main" val="1989987252"/>
-                  </a:ext>
-                </a:extLst>
-              </a:tr>
-              <a:tr h="370840">
-                <a:tc>
-                  <a:txBody>
-                    <a:bodyPr/>
-                    <a:lstStyle/>
-                    <a:p>
-                      <a:pPr marL="0" marR="0" lvl="0" indent="0" algn="l" defTabSz="914400" rtl="0" eaLnBrk="1" fontAlgn="auto" latinLnBrk="0" hangingPunct="1">
-                        <a:lnSpc>
-                          <a:spcPct val="100000"/>
-                        </a:lnSpc>
-                        <a:spcBef>
-                          <a:spcPts val="0"/>
-                        </a:spcBef>
-                        <a:spcAft>
-                          <a:spcPts val="0"/>
-                        </a:spcAft>
-                        <a:buClrTx/>
-                        <a:buSzTx/>
-                        <a:buFontTx/>
-                        <a:buNone/>
-                        <a:tabLst/>
-                        <a:defRPr/>
-                      </a:pPr>
-                      <a:r>
-                        <a:rPr lang="en-US" dirty="0"/>
-                        <a:t>String </a:t>
-                      </a:r>
-                      <a:r>
-                        <a:rPr lang="en-US" dirty="0" err="1"/>
-                        <a:t>lname</a:t>
-                      </a:r>
-                      <a:r>
-                        <a:rPr lang="en-US" dirty="0"/>
-                        <a:t> = </a:t>
-                      </a:r>
-                      <a:r>
-                        <a:rPr lang="en-US" dirty="0" err="1"/>
-                        <a:t>Console.ReadLine</a:t>
-                      </a:r>
-                      <a:r>
-                        <a:rPr lang="en-US" dirty="0"/>
-                        <a:t>();</a:t>
-                      </a:r>
-                      <a:endParaRPr lang="pl-PL" dirty="0"/>
-                    </a:p>
-                  </a:txBody>
-                  <a:tcPr/>
-                </a:tc>
-                <a:extLst>
-                  <a:ext uri="{0D108BD9-81ED-4DB2-BD59-A6C34878D82A}">
-                    <a16:rowId xmlns:a16="http://schemas.microsoft.com/office/drawing/2014/main" val="2869018593"/>
-                  </a:ext>
-                </a:extLst>
-              </a:tr>
-              <a:tr h="370840">
-                <a:tc>
-                  <a:txBody>
-                    <a:bodyPr/>
-                    <a:lstStyle/>
-                    <a:p>
-                      <a:pPr marL="0" marR="0" lvl="0" indent="0" algn="l" defTabSz="914400" rtl="0" eaLnBrk="1" fontAlgn="auto" latinLnBrk="0" hangingPunct="1">
-                        <a:lnSpc>
-                          <a:spcPct val="100000"/>
-                        </a:lnSpc>
-                        <a:spcBef>
-                          <a:spcPts val="0"/>
-                        </a:spcBef>
-                        <a:spcAft>
-                          <a:spcPts val="0"/>
-                        </a:spcAft>
-                        <a:buClrTx/>
-                        <a:buSzTx/>
-                        <a:buFontTx/>
-                        <a:buNone/>
-                        <a:tabLst/>
-                        <a:defRPr/>
-                      </a:pPr>
-                      <a:r>
-                        <a:rPr lang="en-US" dirty="0" err="1"/>
-                        <a:t>Console.WriteLine</a:t>
-                      </a:r>
-                      <a:r>
-                        <a:rPr lang="en-US" dirty="0"/>
-                        <a:t>($”Last: {</a:t>
-                      </a:r>
-                      <a:r>
-                        <a:rPr lang="en-US" dirty="0" err="1"/>
-                        <a:t>lname</a:t>
-                      </a:r>
-                      <a:r>
-                        <a:rPr lang="en-US" dirty="0"/>
-                        <a:t>}”);</a:t>
-                      </a:r>
-                      <a:endParaRPr lang="pl-PL" dirty="0"/>
-                    </a:p>
-                  </a:txBody>
-                  <a:tcPr/>
-                </a:tc>
-                <a:extLst>
-                  <a:ext uri="{0D108BD9-81ED-4DB2-BD59-A6C34878D82A}">
-                    <a16:rowId xmlns:a16="http://schemas.microsoft.com/office/drawing/2014/main" val="3884730997"/>
-                  </a:ext>
-                </a:extLst>
-              </a:tr>
-              <a:tr h="370840">
-                <a:tc>
-                  <a:txBody>
-                    <a:bodyPr/>
-                    <a:lstStyle/>
-                    <a:p>
-                      <a:r>
-                        <a:rPr lang="en-US" dirty="0"/>
-                        <a:t>Random </a:t>
-                      </a:r>
-                      <a:r>
-                        <a:rPr lang="en-US" dirty="0" err="1"/>
-                        <a:t>rnd</a:t>
-                      </a:r>
-                      <a:r>
-                        <a:rPr lang="en-US" dirty="0"/>
-                        <a:t> = new Random();</a:t>
-                      </a:r>
-                      <a:endParaRPr lang="pl-PL" dirty="0"/>
-                    </a:p>
-                  </a:txBody>
-                  <a:tcPr/>
-                </a:tc>
-                <a:extLst>
-                  <a:ext uri="{0D108BD9-81ED-4DB2-BD59-A6C34878D82A}">
-                    <a16:rowId xmlns:a16="http://schemas.microsoft.com/office/drawing/2014/main" val="2298061617"/>
-                  </a:ext>
-                </a:extLst>
-              </a:tr>
-              <a:tr h="370840">
-                <a:tc>
-                  <a:txBody>
-                    <a:bodyPr/>
-                    <a:lstStyle/>
-                    <a:p>
-                      <a:r>
-                        <a:rPr lang="en-US" dirty="0"/>
-                        <a:t>int age = </a:t>
-                      </a:r>
-                      <a:r>
-                        <a:rPr lang="en-US" dirty="0" err="1"/>
-                        <a:t>rnd.Next</a:t>
-                      </a:r>
-                      <a:r>
-                        <a:rPr lang="en-US" dirty="0"/>
-                        <a:t>(18, 60);</a:t>
-                      </a:r>
-                      <a:endParaRPr lang="pl-PL" dirty="0"/>
-                    </a:p>
-                  </a:txBody>
-                  <a:tcPr/>
-                </a:tc>
-                <a:extLst>
-                  <a:ext uri="{0D108BD9-81ED-4DB2-BD59-A6C34878D82A}">
-                    <a16:rowId xmlns:a16="http://schemas.microsoft.com/office/drawing/2014/main" val="1785531089"/>
-                  </a:ext>
-                </a:extLst>
-              </a:tr>
-              <a:tr h="370840">
-                <a:tc>
-                  <a:txBody>
-                    <a:bodyPr/>
-                    <a:lstStyle/>
-                    <a:p>
-                      <a:r>
-                        <a:rPr lang="en-US" dirty="0"/>
-                        <a:t>…</a:t>
-                      </a:r>
-                      <a:endParaRPr lang="pl-PL" dirty="0"/>
-                    </a:p>
-                  </a:txBody>
-                  <a:tcPr/>
-                </a:tc>
-                <a:extLst>
-                  <a:ext uri="{0D108BD9-81ED-4DB2-BD59-A6C34878D82A}">
-                    <a16:rowId xmlns:a16="http://schemas.microsoft.com/office/drawing/2014/main" val="4047409766"/>
-                  </a:ext>
-                </a:extLst>
-              </a:tr>
-            </a:tbl>
-          </a:graphicData>
-        </a:graphic>
-      </p:graphicFrame>
       <p:sp>
         <p:nvSpPr>
           <p:cNvPr id="6" name="Rectangle 5">
@@ -6160,8 +5955,8 @@
         </p:nvSpPr>
         <p:spPr>
           <a:xfrm>
-            <a:off x="1232928" y="1420230"/>
-            <a:ext cx="9581960" cy="1066800"/>
+            <a:off x="1413164" y="1420230"/>
+            <a:ext cx="9401724" cy="1066800"/>
           </a:xfrm>
           <a:prstGeom prst="rect">
             <a:avLst/>
@@ -6193,6 +5988,604 @@
               <a:t>Process</a:t>
             </a:r>
             <a:endParaRPr lang="pl-PL" sz="2400" dirty="0"/>
+          </a:p>
+        </p:txBody>
+      </p:sp>
+      <p:graphicFrame>
+        <p:nvGraphicFramePr>
+          <p:cNvPr id="13" name="Table 4">
+            <a:extLst>
+              <a:ext uri="{FF2B5EF4-FFF2-40B4-BE49-F238E27FC236}">
+                <a16:creationId xmlns:a16="http://schemas.microsoft.com/office/drawing/2014/main" id="{A5FED389-2D61-4B39-A96C-DE4DE7672F3E}"/>
+              </a:ext>
+            </a:extLst>
+          </p:cNvPr>
+          <p:cNvGraphicFramePr>
+            <a:graphicFrameLocks noGrp="1"/>
+          </p:cNvGraphicFramePr>
+          <p:nvPr>
+            <p:extLst>
+              <p:ext uri="{D42A27DB-BD31-4B8C-83A1-F6EECF244321}">
+                <p14:modId xmlns:p14="http://schemas.microsoft.com/office/powerpoint/2010/main" val="1197332070"/>
+              </p:ext>
+            </p:extLst>
+          </p:nvPr>
+        </p:nvGraphicFramePr>
+        <p:xfrm>
+          <a:off x="3288842" y="3022092"/>
+          <a:ext cx="1187322" cy="2966720"/>
+        </p:xfrm>
+        <a:graphic>
+          <a:graphicData uri="http://schemas.openxmlformats.org/drawingml/2006/table">
+            <a:tbl>
+              <a:tblPr firstRow="1" bandRow="1">
+                <a:tableStyleId>{073A0DAA-6AF3-43AB-8588-CEC1D06C72B9}</a:tableStyleId>
+              </a:tblPr>
+              <a:tblGrid>
+                <a:gridCol w="1187322">
+                  <a:extLst>
+                    <a:ext uri="{9D8B030D-6E8A-4147-A177-3AD203B41FA5}">
+                      <a16:colId xmlns:a16="http://schemas.microsoft.com/office/drawing/2014/main" val="165492483"/>
+                    </a:ext>
+                  </a:extLst>
+                </a:gridCol>
+              </a:tblGrid>
+              <a:tr h="370840">
+                <a:tc>
+                  <a:txBody>
+                    <a:bodyPr/>
+                    <a:lstStyle/>
+                    <a:p>
+                      <a:pPr algn="ctr"/>
+                      <a:r>
+                        <a:rPr lang="en-US" dirty="0"/>
+                        <a:t>Thread </a:t>
+                      </a:r>
+                      <a:r>
+                        <a:rPr lang="pl-PL" dirty="0"/>
+                        <a:t>2</a:t>
+                      </a:r>
+                    </a:p>
+                  </a:txBody>
+                  <a:tcPr/>
+                </a:tc>
+                <a:extLst>
+                  <a:ext uri="{0D108BD9-81ED-4DB2-BD59-A6C34878D82A}">
+                    <a16:rowId xmlns:a16="http://schemas.microsoft.com/office/drawing/2014/main" val="2771007643"/>
+                  </a:ext>
+                </a:extLst>
+              </a:tr>
+              <a:tr h="370840">
+                <a:tc>
+                  <a:txBody>
+                    <a:bodyPr/>
+                    <a:lstStyle/>
+                    <a:p>
+                      <a:endParaRPr lang="pl-PL" dirty="0"/>
+                    </a:p>
+                  </a:txBody>
+                  <a:tcPr/>
+                </a:tc>
+                <a:extLst>
+                  <a:ext uri="{0D108BD9-81ED-4DB2-BD59-A6C34878D82A}">
+                    <a16:rowId xmlns:a16="http://schemas.microsoft.com/office/drawing/2014/main" val="983031422"/>
+                  </a:ext>
+                </a:extLst>
+              </a:tr>
+              <a:tr h="370840">
+                <a:tc>
+                  <a:txBody>
+                    <a:bodyPr/>
+                    <a:lstStyle/>
+                    <a:p>
+                      <a:endParaRPr lang="pl-PL" dirty="0"/>
+                    </a:p>
+                  </a:txBody>
+                  <a:tcPr/>
+                </a:tc>
+                <a:extLst>
+                  <a:ext uri="{0D108BD9-81ED-4DB2-BD59-A6C34878D82A}">
+                    <a16:rowId xmlns:a16="http://schemas.microsoft.com/office/drawing/2014/main" val="1989987252"/>
+                  </a:ext>
+                </a:extLst>
+              </a:tr>
+              <a:tr h="370840">
+                <a:tc>
+                  <a:txBody>
+                    <a:bodyPr/>
+                    <a:lstStyle/>
+                    <a:p>
+                      <a:endParaRPr lang="pl-PL" dirty="0"/>
+                    </a:p>
+                  </a:txBody>
+                  <a:tcPr/>
+                </a:tc>
+                <a:extLst>
+                  <a:ext uri="{0D108BD9-81ED-4DB2-BD59-A6C34878D82A}">
+                    <a16:rowId xmlns:a16="http://schemas.microsoft.com/office/drawing/2014/main" val="2869018593"/>
+                  </a:ext>
+                </a:extLst>
+              </a:tr>
+              <a:tr h="370840">
+                <a:tc>
+                  <a:txBody>
+                    <a:bodyPr/>
+                    <a:lstStyle/>
+                    <a:p>
+                      <a:endParaRPr lang="pl-PL" dirty="0"/>
+                    </a:p>
+                  </a:txBody>
+                  <a:tcPr/>
+                </a:tc>
+                <a:extLst>
+                  <a:ext uri="{0D108BD9-81ED-4DB2-BD59-A6C34878D82A}">
+                    <a16:rowId xmlns:a16="http://schemas.microsoft.com/office/drawing/2014/main" val="3884730997"/>
+                  </a:ext>
+                </a:extLst>
+              </a:tr>
+              <a:tr h="370840">
+                <a:tc>
+                  <a:txBody>
+                    <a:bodyPr/>
+                    <a:lstStyle/>
+                    <a:p>
+                      <a:endParaRPr lang="pl-PL" dirty="0"/>
+                    </a:p>
+                  </a:txBody>
+                  <a:tcPr/>
+                </a:tc>
+                <a:extLst>
+                  <a:ext uri="{0D108BD9-81ED-4DB2-BD59-A6C34878D82A}">
+                    <a16:rowId xmlns:a16="http://schemas.microsoft.com/office/drawing/2014/main" val="2298061617"/>
+                  </a:ext>
+                </a:extLst>
+              </a:tr>
+              <a:tr h="370840">
+                <a:tc>
+                  <a:txBody>
+                    <a:bodyPr/>
+                    <a:lstStyle/>
+                    <a:p>
+                      <a:endParaRPr lang="pl-PL" dirty="0"/>
+                    </a:p>
+                  </a:txBody>
+                  <a:tcPr/>
+                </a:tc>
+                <a:extLst>
+                  <a:ext uri="{0D108BD9-81ED-4DB2-BD59-A6C34878D82A}">
+                    <a16:rowId xmlns:a16="http://schemas.microsoft.com/office/drawing/2014/main" val="1785531089"/>
+                  </a:ext>
+                </a:extLst>
+              </a:tr>
+              <a:tr h="370840">
+                <a:tc>
+                  <a:txBody>
+                    <a:bodyPr/>
+                    <a:lstStyle/>
+                    <a:p>
+                      <a:endParaRPr lang="pl-PL" dirty="0"/>
+                    </a:p>
+                  </a:txBody>
+                  <a:tcPr/>
+                </a:tc>
+                <a:extLst>
+                  <a:ext uri="{0D108BD9-81ED-4DB2-BD59-A6C34878D82A}">
+                    <a16:rowId xmlns:a16="http://schemas.microsoft.com/office/drawing/2014/main" val="4047409766"/>
+                  </a:ext>
+                </a:extLst>
+              </a:tr>
+            </a:tbl>
+          </a:graphicData>
+        </a:graphic>
+      </p:graphicFrame>
+      <p:graphicFrame>
+        <p:nvGraphicFramePr>
+          <p:cNvPr id="15" name="Table 4">
+            <a:extLst>
+              <a:ext uri="{FF2B5EF4-FFF2-40B4-BE49-F238E27FC236}">
+                <a16:creationId xmlns:a16="http://schemas.microsoft.com/office/drawing/2014/main" id="{A9E342D6-5E70-4027-8E19-8DA433017C55}"/>
+              </a:ext>
+            </a:extLst>
+          </p:cNvPr>
+          <p:cNvGraphicFramePr>
+            <a:graphicFrameLocks noGrp="1"/>
+          </p:cNvGraphicFramePr>
+          <p:nvPr>
+            <p:extLst>
+              <p:ext uri="{D42A27DB-BD31-4B8C-83A1-F6EECF244321}">
+                <p14:modId xmlns:p14="http://schemas.microsoft.com/office/powerpoint/2010/main" val="156326496"/>
+              </p:ext>
+            </p:extLst>
+          </p:nvPr>
+        </p:nvGraphicFramePr>
+        <p:xfrm>
+          <a:off x="5206101" y="3022092"/>
+          <a:ext cx="1187322" cy="2966720"/>
+        </p:xfrm>
+        <a:graphic>
+          <a:graphicData uri="http://schemas.openxmlformats.org/drawingml/2006/table">
+            <a:tbl>
+              <a:tblPr firstRow="1" bandRow="1">
+                <a:tableStyleId>{073A0DAA-6AF3-43AB-8588-CEC1D06C72B9}</a:tableStyleId>
+              </a:tblPr>
+              <a:tblGrid>
+                <a:gridCol w="1187322">
+                  <a:extLst>
+                    <a:ext uri="{9D8B030D-6E8A-4147-A177-3AD203B41FA5}">
+                      <a16:colId xmlns:a16="http://schemas.microsoft.com/office/drawing/2014/main" val="165492483"/>
+                    </a:ext>
+                  </a:extLst>
+                </a:gridCol>
+              </a:tblGrid>
+              <a:tr h="370840">
+                <a:tc>
+                  <a:txBody>
+                    <a:bodyPr/>
+                    <a:lstStyle/>
+                    <a:p>
+                      <a:pPr algn="ctr"/>
+                      <a:r>
+                        <a:rPr lang="en-US" dirty="0"/>
+                        <a:t>Thread </a:t>
+                      </a:r>
+                      <a:r>
+                        <a:rPr lang="pl-PL" dirty="0"/>
+                        <a:t>3</a:t>
+                      </a:r>
+                    </a:p>
+                  </a:txBody>
+                  <a:tcPr/>
+                </a:tc>
+                <a:extLst>
+                  <a:ext uri="{0D108BD9-81ED-4DB2-BD59-A6C34878D82A}">
+                    <a16:rowId xmlns:a16="http://schemas.microsoft.com/office/drawing/2014/main" val="2771007643"/>
+                  </a:ext>
+                </a:extLst>
+              </a:tr>
+              <a:tr h="370840">
+                <a:tc>
+                  <a:txBody>
+                    <a:bodyPr/>
+                    <a:lstStyle/>
+                    <a:p>
+                      <a:endParaRPr lang="pl-PL" dirty="0"/>
+                    </a:p>
+                  </a:txBody>
+                  <a:tcPr/>
+                </a:tc>
+                <a:extLst>
+                  <a:ext uri="{0D108BD9-81ED-4DB2-BD59-A6C34878D82A}">
+                    <a16:rowId xmlns:a16="http://schemas.microsoft.com/office/drawing/2014/main" val="983031422"/>
+                  </a:ext>
+                </a:extLst>
+              </a:tr>
+              <a:tr h="370840">
+                <a:tc>
+                  <a:txBody>
+                    <a:bodyPr/>
+                    <a:lstStyle/>
+                    <a:p>
+                      <a:endParaRPr lang="pl-PL" dirty="0"/>
+                    </a:p>
+                  </a:txBody>
+                  <a:tcPr/>
+                </a:tc>
+                <a:extLst>
+                  <a:ext uri="{0D108BD9-81ED-4DB2-BD59-A6C34878D82A}">
+                    <a16:rowId xmlns:a16="http://schemas.microsoft.com/office/drawing/2014/main" val="1989987252"/>
+                  </a:ext>
+                </a:extLst>
+              </a:tr>
+              <a:tr h="370840">
+                <a:tc>
+                  <a:txBody>
+                    <a:bodyPr/>
+                    <a:lstStyle/>
+                    <a:p>
+                      <a:endParaRPr lang="pl-PL" dirty="0"/>
+                    </a:p>
+                  </a:txBody>
+                  <a:tcPr/>
+                </a:tc>
+                <a:extLst>
+                  <a:ext uri="{0D108BD9-81ED-4DB2-BD59-A6C34878D82A}">
+                    <a16:rowId xmlns:a16="http://schemas.microsoft.com/office/drawing/2014/main" val="2869018593"/>
+                  </a:ext>
+                </a:extLst>
+              </a:tr>
+              <a:tr h="370840">
+                <a:tc>
+                  <a:txBody>
+                    <a:bodyPr/>
+                    <a:lstStyle/>
+                    <a:p>
+                      <a:endParaRPr lang="pl-PL" dirty="0"/>
+                    </a:p>
+                  </a:txBody>
+                  <a:tcPr/>
+                </a:tc>
+                <a:extLst>
+                  <a:ext uri="{0D108BD9-81ED-4DB2-BD59-A6C34878D82A}">
+                    <a16:rowId xmlns:a16="http://schemas.microsoft.com/office/drawing/2014/main" val="3884730997"/>
+                  </a:ext>
+                </a:extLst>
+              </a:tr>
+              <a:tr h="370840">
+                <a:tc>
+                  <a:txBody>
+                    <a:bodyPr/>
+                    <a:lstStyle/>
+                    <a:p>
+                      <a:endParaRPr lang="pl-PL" dirty="0"/>
+                    </a:p>
+                  </a:txBody>
+                  <a:tcPr/>
+                </a:tc>
+                <a:extLst>
+                  <a:ext uri="{0D108BD9-81ED-4DB2-BD59-A6C34878D82A}">
+                    <a16:rowId xmlns:a16="http://schemas.microsoft.com/office/drawing/2014/main" val="2298061617"/>
+                  </a:ext>
+                </a:extLst>
+              </a:tr>
+              <a:tr h="370840">
+                <a:tc>
+                  <a:txBody>
+                    <a:bodyPr/>
+                    <a:lstStyle/>
+                    <a:p>
+                      <a:endParaRPr lang="pl-PL" dirty="0"/>
+                    </a:p>
+                  </a:txBody>
+                  <a:tcPr/>
+                </a:tc>
+                <a:extLst>
+                  <a:ext uri="{0D108BD9-81ED-4DB2-BD59-A6C34878D82A}">
+                    <a16:rowId xmlns:a16="http://schemas.microsoft.com/office/drawing/2014/main" val="1785531089"/>
+                  </a:ext>
+                </a:extLst>
+              </a:tr>
+              <a:tr h="370840">
+                <a:tc>
+                  <a:txBody>
+                    <a:bodyPr/>
+                    <a:lstStyle/>
+                    <a:p>
+                      <a:endParaRPr lang="pl-PL" dirty="0"/>
+                    </a:p>
+                  </a:txBody>
+                  <a:tcPr/>
+                </a:tc>
+                <a:extLst>
+                  <a:ext uri="{0D108BD9-81ED-4DB2-BD59-A6C34878D82A}">
+                    <a16:rowId xmlns:a16="http://schemas.microsoft.com/office/drawing/2014/main" val="4047409766"/>
+                  </a:ext>
+                </a:extLst>
+              </a:tr>
+            </a:tbl>
+          </a:graphicData>
+        </a:graphic>
+      </p:graphicFrame>
+      <p:graphicFrame>
+        <p:nvGraphicFramePr>
+          <p:cNvPr id="16" name="Table 4">
+            <a:extLst>
+              <a:ext uri="{FF2B5EF4-FFF2-40B4-BE49-F238E27FC236}">
+                <a16:creationId xmlns:a16="http://schemas.microsoft.com/office/drawing/2014/main" id="{613E68FB-ECDB-441C-A3C9-DD7B9A490B6B}"/>
+              </a:ext>
+            </a:extLst>
+          </p:cNvPr>
+          <p:cNvGraphicFramePr>
+            <a:graphicFrameLocks noGrp="1"/>
+          </p:cNvGraphicFramePr>
+          <p:nvPr>
+            <p:extLst>
+              <p:ext uri="{D42A27DB-BD31-4B8C-83A1-F6EECF244321}">
+                <p14:modId xmlns:p14="http://schemas.microsoft.com/office/powerpoint/2010/main" val="1143699688"/>
+              </p:ext>
+            </p:extLst>
+          </p:nvPr>
+        </p:nvGraphicFramePr>
+        <p:xfrm>
+          <a:off x="9575841" y="3024702"/>
+          <a:ext cx="1187322" cy="2966720"/>
+        </p:xfrm>
+        <a:graphic>
+          <a:graphicData uri="http://schemas.openxmlformats.org/drawingml/2006/table">
+            <a:tbl>
+              <a:tblPr firstRow="1" bandRow="1">
+                <a:tableStyleId>{073A0DAA-6AF3-43AB-8588-CEC1D06C72B9}</a:tableStyleId>
+              </a:tblPr>
+              <a:tblGrid>
+                <a:gridCol w="1187322">
+                  <a:extLst>
+                    <a:ext uri="{9D8B030D-6E8A-4147-A177-3AD203B41FA5}">
+                      <a16:colId xmlns:a16="http://schemas.microsoft.com/office/drawing/2014/main" val="165492483"/>
+                    </a:ext>
+                  </a:extLst>
+                </a:gridCol>
+              </a:tblGrid>
+              <a:tr h="370840">
+                <a:tc>
+                  <a:txBody>
+                    <a:bodyPr/>
+                    <a:lstStyle/>
+                    <a:p>
+                      <a:pPr algn="ctr"/>
+                      <a:r>
+                        <a:rPr lang="en-US" dirty="0"/>
+                        <a:t>Thread </a:t>
+                      </a:r>
+                      <a:r>
+                        <a:rPr lang="pl-PL" dirty="0"/>
+                        <a:t>N</a:t>
+                      </a:r>
+                    </a:p>
+                  </a:txBody>
+                  <a:tcPr/>
+                </a:tc>
+                <a:extLst>
+                  <a:ext uri="{0D108BD9-81ED-4DB2-BD59-A6C34878D82A}">
+                    <a16:rowId xmlns:a16="http://schemas.microsoft.com/office/drawing/2014/main" val="2771007643"/>
+                  </a:ext>
+                </a:extLst>
+              </a:tr>
+              <a:tr h="370840">
+                <a:tc>
+                  <a:txBody>
+                    <a:bodyPr/>
+                    <a:lstStyle/>
+                    <a:p>
+                      <a:endParaRPr lang="pl-PL" dirty="0"/>
+                    </a:p>
+                  </a:txBody>
+                  <a:tcPr/>
+                </a:tc>
+                <a:extLst>
+                  <a:ext uri="{0D108BD9-81ED-4DB2-BD59-A6C34878D82A}">
+                    <a16:rowId xmlns:a16="http://schemas.microsoft.com/office/drawing/2014/main" val="983031422"/>
+                  </a:ext>
+                </a:extLst>
+              </a:tr>
+              <a:tr h="370840">
+                <a:tc>
+                  <a:txBody>
+                    <a:bodyPr/>
+                    <a:lstStyle/>
+                    <a:p>
+                      <a:endParaRPr lang="pl-PL" dirty="0"/>
+                    </a:p>
+                  </a:txBody>
+                  <a:tcPr/>
+                </a:tc>
+                <a:extLst>
+                  <a:ext uri="{0D108BD9-81ED-4DB2-BD59-A6C34878D82A}">
+                    <a16:rowId xmlns:a16="http://schemas.microsoft.com/office/drawing/2014/main" val="1989987252"/>
+                  </a:ext>
+                </a:extLst>
+              </a:tr>
+              <a:tr h="370840">
+                <a:tc>
+                  <a:txBody>
+                    <a:bodyPr/>
+                    <a:lstStyle/>
+                    <a:p>
+                      <a:endParaRPr lang="pl-PL" dirty="0"/>
+                    </a:p>
+                  </a:txBody>
+                  <a:tcPr/>
+                </a:tc>
+                <a:extLst>
+                  <a:ext uri="{0D108BD9-81ED-4DB2-BD59-A6C34878D82A}">
+                    <a16:rowId xmlns:a16="http://schemas.microsoft.com/office/drawing/2014/main" val="2869018593"/>
+                  </a:ext>
+                </a:extLst>
+              </a:tr>
+              <a:tr h="370840">
+                <a:tc>
+                  <a:txBody>
+                    <a:bodyPr/>
+                    <a:lstStyle/>
+                    <a:p>
+                      <a:endParaRPr lang="pl-PL" dirty="0"/>
+                    </a:p>
+                  </a:txBody>
+                  <a:tcPr/>
+                </a:tc>
+                <a:extLst>
+                  <a:ext uri="{0D108BD9-81ED-4DB2-BD59-A6C34878D82A}">
+                    <a16:rowId xmlns:a16="http://schemas.microsoft.com/office/drawing/2014/main" val="3884730997"/>
+                  </a:ext>
+                </a:extLst>
+              </a:tr>
+              <a:tr h="370840">
+                <a:tc>
+                  <a:txBody>
+                    <a:bodyPr/>
+                    <a:lstStyle/>
+                    <a:p>
+                      <a:endParaRPr lang="pl-PL" dirty="0"/>
+                    </a:p>
+                  </a:txBody>
+                  <a:tcPr/>
+                </a:tc>
+                <a:extLst>
+                  <a:ext uri="{0D108BD9-81ED-4DB2-BD59-A6C34878D82A}">
+                    <a16:rowId xmlns:a16="http://schemas.microsoft.com/office/drawing/2014/main" val="2298061617"/>
+                  </a:ext>
+                </a:extLst>
+              </a:tr>
+              <a:tr h="370840">
+                <a:tc>
+                  <a:txBody>
+                    <a:bodyPr/>
+                    <a:lstStyle/>
+                    <a:p>
+                      <a:endParaRPr lang="pl-PL" dirty="0"/>
+                    </a:p>
+                  </a:txBody>
+                  <a:tcPr/>
+                </a:tc>
+                <a:extLst>
+                  <a:ext uri="{0D108BD9-81ED-4DB2-BD59-A6C34878D82A}">
+                    <a16:rowId xmlns:a16="http://schemas.microsoft.com/office/drawing/2014/main" val="1785531089"/>
+                  </a:ext>
+                </a:extLst>
+              </a:tr>
+              <a:tr h="370840">
+                <a:tc>
+                  <a:txBody>
+                    <a:bodyPr/>
+                    <a:lstStyle/>
+                    <a:p>
+                      <a:endParaRPr lang="pl-PL" dirty="0"/>
+                    </a:p>
+                  </a:txBody>
+                  <a:tcPr/>
+                </a:tc>
+                <a:extLst>
+                  <a:ext uri="{0D108BD9-81ED-4DB2-BD59-A6C34878D82A}">
+                    <a16:rowId xmlns:a16="http://schemas.microsoft.com/office/drawing/2014/main" val="4047409766"/>
+                  </a:ext>
+                </a:extLst>
+              </a:tr>
+            </a:tbl>
+          </a:graphicData>
+        </a:graphic>
+      </p:graphicFrame>
+      <p:sp>
+        <p:nvSpPr>
+          <p:cNvPr id="3" name="TextBox 2">
+            <a:extLst>
+              <a:ext uri="{FF2B5EF4-FFF2-40B4-BE49-F238E27FC236}">
+                <a16:creationId xmlns:a16="http://schemas.microsoft.com/office/drawing/2014/main" id="{169C5930-6204-441F-B32F-53607CCC5C0D}"/>
+              </a:ext>
+            </a:extLst>
+          </p:cNvPr>
+          <p:cNvSpPr txBox="1"/>
+          <p:nvPr/>
+        </p:nvSpPr>
+        <p:spPr>
+          <a:xfrm>
+            <a:off x="7030058" y="3629891"/>
+            <a:ext cx="1893455" cy="1077218"/>
+          </a:xfrm>
+          <a:prstGeom prst="rect">
+            <a:avLst/>
+          </a:prstGeom>
+          <a:noFill/>
+        </p:spPr>
+        <p:txBody>
+          <a:bodyPr wrap="square" rtlCol="0">
+            <a:spAutoFit/>
+          </a:bodyPr>
+          <a:lstStyle/>
+          <a:p>
+            <a:pPr algn="ctr"/>
+            <a:r>
+              <a:rPr lang="pl-PL" sz="6400" dirty="0"/>
+              <a:t>...</a:t>
+            </a:r>
+            <a:endParaRPr lang="en-US" sz="6400" dirty="0"/>
           </a:p>
         </p:txBody>
       </p:sp>
@@ -6280,7 +6673,7 @@
                             </p:stCondLst>
                             <p:childTnLst>
                               <p:par>
-                                <p:cTn id="10" presetID="1" presetClass="entr" presetSubtype="0" fill="hold" nodeType="clickEffect">
+                                <p:cTn id="10" presetID="10" presetClass="entr" presetSubtype="0" fill="hold" nodeType="clickEffect">
                                   <p:stCondLst>
                                     <p:cond delay="0"/>
                                   </p:stCondLst>
@@ -6303,6 +6696,14 @@
                                         <p:strVal val="visible"/>
                                       </p:to>
                                     </p:set>
+                                    <p:animEffect transition="in" filter="fade">
+                                      <p:cBhvr>
+                                        <p:cTn id="12" dur="500"/>
+                                        <p:tgtEl>
+                                          <p:spTgt spid="9"/>
+                                        </p:tgtEl>
+                                      </p:cBhvr>
+                                    </p:animEffect>
                                   </p:childTnLst>
                                 </p:cTn>
                               </p:par>
@@ -6313,32 +6714,32 @@
                     </p:cTn>
                   </p:par>
                   <p:par>
-                    <p:cTn id="12" fill="hold">
+                    <p:cTn id="13" fill="hold">
                       <p:stCondLst>
                         <p:cond delay="indefinite"/>
                       </p:stCondLst>
                       <p:childTnLst>
                         <p:par>
-                          <p:cTn id="13" fill="hold">
+                          <p:cTn id="14" fill="hold">
                             <p:stCondLst>
                               <p:cond delay="0"/>
                             </p:stCondLst>
                             <p:childTnLst>
                               <p:par>
-                                <p:cTn id="14" presetID="1" presetClass="entr" presetSubtype="0" fill="hold" nodeType="clickEffect">
+                                <p:cTn id="15" presetID="10" presetClass="entr" presetSubtype="0" fill="hold" nodeType="clickEffect">
                                   <p:stCondLst>
                                     <p:cond delay="0"/>
                                   </p:stCondLst>
                                   <p:childTnLst>
                                     <p:set>
                                       <p:cBhvr>
-                                        <p:cTn id="15" dur="1" fill="hold">
+                                        <p:cTn id="16" dur="1" fill="hold">
                                           <p:stCondLst>
                                             <p:cond delay="0"/>
                                           </p:stCondLst>
                                         </p:cTn>
                                         <p:tgtEl>
-                                          <p:spTgt spid="11"/>
+                                          <p:spTgt spid="13"/>
                                         </p:tgtEl>
                                         <p:attrNameLst>
                                           <p:attrName>style.visibility</p:attrName>
@@ -6348,6 +6749,173 @@
                                         <p:strVal val="visible"/>
                                       </p:to>
                                     </p:set>
+                                    <p:animEffect transition="in" filter="fade">
+                                      <p:cBhvr>
+                                        <p:cTn id="17" dur="500"/>
+                                        <p:tgtEl>
+                                          <p:spTgt spid="13"/>
+                                        </p:tgtEl>
+                                      </p:cBhvr>
+                                    </p:animEffect>
+                                  </p:childTnLst>
+                                </p:cTn>
+                              </p:par>
+                            </p:childTnLst>
+                          </p:cTn>
+                        </p:par>
+                      </p:childTnLst>
+                    </p:cTn>
+                  </p:par>
+                  <p:par>
+                    <p:cTn id="18" fill="hold">
+                      <p:stCondLst>
+                        <p:cond delay="indefinite"/>
+                      </p:stCondLst>
+                      <p:childTnLst>
+                        <p:par>
+                          <p:cTn id="19" fill="hold">
+                            <p:stCondLst>
+                              <p:cond delay="0"/>
+                            </p:stCondLst>
+                            <p:childTnLst>
+                              <p:par>
+                                <p:cTn id="20" presetID="10" presetClass="entr" presetSubtype="0" fill="hold" nodeType="clickEffect">
+                                  <p:stCondLst>
+                                    <p:cond delay="0"/>
+                                  </p:stCondLst>
+                                  <p:childTnLst>
+                                    <p:set>
+                                      <p:cBhvr>
+                                        <p:cTn id="21" dur="1" fill="hold">
+                                          <p:stCondLst>
+                                            <p:cond delay="0"/>
+                                          </p:stCondLst>
+                                        </p:cTn>
+                                        <p:tgtEl>
+                                          <p:spTgt spid="15"/>
+                                        </p:tgtEl>
+                                        <p:attrNameLst>
+                                          <p:attrName>style.visibility</p:attrName>
+                                        </p:attrNameLst>
+                                      </p:cBhvr>
+                                      <p:to>
+                                        <p:strVal val="visible"/>
+                                      </p:to>
+                                    </p:set>
+                                    <p:animEffect transition="in" filter="fade">
+                                      <p:cBhvr>
+                                        <p:cTn id="22" dur="500"/>
+                                        <p:tgtEl>
+                                          <p:spTgt spid="15"/>
+                                        </p:tgtEl>
+                                      </p:cBhvr>
+                                    </p:animEffect>
+                                  </p:childTnLst>
+                                </p:cTn>
+                              </p:par>
+                            </p:childTnLst>
+                          </p:cTn>
+                        </p:par>
+                      </p:childTnLst>
+                    </p:cTn>
+                  </p:par>
+                  <p:par>
+                    <p:cTn id="23" fill="hold">
+                      <p:stCondLst>
+                        <p:cond delay="indefinite"/>
+                      </p:stCondLst>
+                      <p:childTnLst>
+                        <p:par>
+                          <p:cTn id="24" fill="hold">
+                            <p:stCondLst>
+                              <p:cond delay="0"/>
+                            </p:stCondLst>
+                            <p:childTnLst>
+                              <p:par>
+                                <p:cTn id="25" presetID="10" presetClass="entr" presetSubtype="0" fill="hold" grpId="0" nodeType="clickEffect">
+                                  <p:stCondLst>
+                                    <p:cond delay="0"/>
+                                  </p:stCondLst>
+                                  <p:childTnLst>
+                                    <p:set>
+                                      <p:cBhvr>
+                                        <p:cTn id="26" dur="1" fill="hold">
+                                          <p:stCondLst>
+                                            <p:cond delay="0"/>
+                                          </p:stCondLst>
+                                        </p:cTn>
+                                        <p:tgtEl>
+                                          <p:spTgt spid="3"/>
+                                        </p:tgtEl>
+                                        <p:attrNameLst>
+                                          <p:attrName>style.visibility</p:attrName>
+                                        </p:attrNameLst>
+                                      </p:cBhvr>
+                                      <p:to>
+                                        <p:strVal val="visible"/>
+                                      </p:to>
+                                    </p:set>
+                                    <p:animEffect transition="in" filter="fade">
+                                      <p:cBhvr>
+                                        <p:cTn id="27" dur="500"/>
+                                        <p:tgtEl>
+                                          <p:spTgt spid="3"/>
+                                        </p:tgtEl>
+                                      </p:cBhvr>
+                                    </p:animEffect>
+                                  </p:childTnLst>
+                                </p:cTn>
+                              </p:par>
+                            </p:childTnLst>
+                          </p:cTn>
+                        </p:par>
+                      </p:childTnLst>
+                    </p:cTn>
+                  </p:par>
+                  <p:par>
+                    <p:cTn id="28" fill="hold">
+                      <p:stCondLst>
+                        <p:cond delay="indefinite"/>
+                      </p:stCondLst>
+                      <p:childTnLst>
+                        <p:par>
+                          <p:cTn id="29" fill="hold">
+                            <p:stCondLst>
+                              <p:cond delay="0"/>
+                            </p:stCondLst>
+                            <p:childTnLst>
+                              <p:par>
+                                <p:cTn id="30" presetID="10" presetClass="entr" presetSubtype="0" fill="hold" nodeType="clickEffect">
+                                  <p:stCondLst>
+                                    <p:cond delay="0"/>
+                                  </p:stCondLst>
+                                  <p:childTnLst>
+                                    <p:set>
+                                      <p:cBhvr>
+                                        <p:cTn id="31" dur="1" fill="hold">
+                                          <p:stCondLst>
+                                            <p:cond delay="0"/>
+                                          </p:stCondLst>
+                                        </p:cTn>
+                                        <p:tgtEl>
+                                          <p:spTgt spid="16"/>
+                                        </p:tgtEl>
+                                        <p:attrNameLst>
+                                          <p:attrName>style.visibility</p:attrName>
+                                        </p:attrNameLst>
+                                      </p:cBhvr>
+                                      <p:to>
+                                        <p:strVal val="visible"/>
+                                      </p:to>
+                                    </p:set>
+                                    <p:animEffect transition="in" filter="fade">
+                                      <p:cBhvr>
+                                        <p:cTn id="32" dur="500"/>
+                                        <p:tgtEl>
+                                          <p:spTgt spid="16"/>
+                                        </p:tgtEl>
+                                      </p:cBhvr>
+                                    </p:animEffect>
                                   </p:childTnLst>
                                 </p:cTn>
                               </p:par>
@@ -6380,6 +6948,7 @@
     </p:tnLst>
     <p:bldLst>
       <p:bldP spid="6" grpId="0" animBg="1"/>
+      <p:bldP spid="3" grpId="0"/>
     </p:bldLst>
   </p:timing>
 </p:sld>

</xml_diff>

<commit_message>
Adding slide with learning objectives
</commit_message>
<xml_diff>
--- a/MultiThreading/!Materials/Multithreading - Animation.pptx
+++ b/MultiThreading/!Materials/Multithreading - Animation.pptx
@@ -6,11 +6,12 @@
   </p:sldMasterIdLst>
   <p:sldIdLst>
     <p:sldId id="256" r:id="rId2"/>
-    <p:sldId id="257" r:id="rId3"/>
-    <p:sldId id="258" r:id="rId4"/>
-    <p:sldId id="259" r:id="rId5"/>
-    <p:sldId id="260" r:id="rId6"/>
-    <p:sldId id="261" r:id="rId7"/>
+    <p:sldId id="262" r:id="rId3"/>
+    <p:sldId id="257" r:id="rId4"/>
+    <p:sldId id="258" r:id="rId5"/>
+    <p:sldId id="259" r:id="rId6"/>
+    <p:sldId id="260" r:id="rId7"/>
+    <p:sldId id="261" r:id="rId8"/>
   </p:sldIdLst>
   <p:sldSz cx="12192000" cy="6858000"/>
   <p:notesSz cx="6858000" cy="9144000"/>
@@ -278,7 +279,7 @@
           <a:p>
             <a:fld id="{7F6AC9B7-E31F-47FE-9611-607B9E53C61A}" type="datetimeFigureOut">
               <a:rPr lang="pl-PL" smtClean="0"/>
-              <a:t>15.12.2020</a:t>
+              <a:t>16.12.2020</a:t>
             </a:fld>
             <a:endParaRPr lang="pl-PL"/>
           </a:p>
@@ -478,7 +479,7 @@
           <a:p>
             <a:fld id="{7F6AC9B7-E31F-47FE-9611-607B9E53C61A}" type="datetimeFigureOut">
               <a:rPr lang="pl-PL" smtClean="0"/>
-              <a:t>15.12.2020</a:t>
+              <a:t>16.12.2020</a:t>
             </a:fld>
             <a:endParaRPr lang="pl-PL"/>
           </a:p>
@@ -688,7 +689,7 @@
           <a:p>
             <a:fld id="{7F6AC9B7-E31F-47FE-9611-607B9E53C61A}" type="datetimeFigureOut">
               <a:rPr lang="pl-PL" smtClean="0"/>
-              <a:t>15.12.2020</a:t>
+              <a:t>16.12.2020</a:t>
             </a:fld>
             <a:endParaRPr lang="pl-PL"/>
           </a:p>
@@ -888,7 +889,7 @@
           <a:p>
             <a:fld id="{7F6AC9B7-E31F-47FE-9611-607B9E53C61A}" type="datetimeFigureOut">
               <a:rPr lang="pl-PL" smtClean="0"/>
-              <a:t>15.12.2020</a:t>
+              <a:t>16.12.2020</a:t>
             </a:fld>
             <a:endParaRPr lang="pl-PL"/>
           </a:p>
@@ -1164,7 +1165,7 @@
           <a:p>
             <a:fld id="{7F6AC9B7-E31F-47FE-9611-607B9E53C61A}" type="datetimeFigureOut">
               <a:rPr lang="pl-PL" smtClean="0"/>
-              <a:t>15.12.2020</a:t>
+              <a:t>16.12.2020</a:t>
             </a:fld>
             <a:endParaRPr lang="pl-PL"/>
           </a:p>
@@ -1432,7 +1433,7 @@
           <a:p>
             <a:fld id="{7F6AC9B7-E31F-47FE-9611-607B9E53C61A}" type="datetimeFigureOut">
               <a:rPr lang="pl-PL" smtClean="0"/>
-              <a:t>15.12.2020</a:t>
+              <a:t>16.12.2020</a:t>
             </a:fld>
             <a:endParaRPr lang="pl-PL"/>
           </a:p>
@@ -1847,7 +1848,7 @@
           <a:p>
             <a:fld id="{7F6AC9B7-E31F-47FE-9611-607B9E53C61A}" type="datetimeFigureOut">
               <a:rPr lang="pl-PL" smtClean="0"/>
-              <a:t>15.12.2020</a:t>
+              <a:t>16.12.2020</a:t>
             </a:fld>
             <a:endParaRPr lang="pl-PL"/>
           </a:p>
@@ -1989,7 +1990,7 @@
           <a:p>
             <a:fld id="{7F6AC9B7-E31F-47FE-9611-607B9E53C61A}" type="datetimeFigureOut">
               <a:rPr lang="pl-PL" smtClean="0"/>
-              <a:t>15.12.2020</a:t>
+              <a:t>16.12.2020</a:t>
             </a:fld>
             <a:endParaRPr lang="pl-PL"/>
           </a:p>
@@ -2102,7 +2103,7 @@
           <a:p>
             <a:fld id="{7F6AC9B7-E31F-47FE-9611-607B9E53C61A}" type="datetimeFigureOut">
               <a:rPr lang="pl-PL" smtClean="0"/>
-              <a:t>15.12.2020</a:t>
+              <a:t>16.12.2020</a:t>
             </a:fld>
             <a:endParaRPr lang="pl-PL"/>
           </a:p>
@@ -2415,7 +2416,7 @@
           <a:p>
             <a:fld id="{7F6AC9B7-E31F-47FE-9611-607B9E53C61A}" type="datetimeFigureOut">
               <a:rPr lang="pl-PL" smtClean="0"/>
-              <a:t>15.12.2020</a:t>
+              <a:t>16.12.2020</a:t>
             </a:fld>
             <a:endParaRPr lang="pl-PL"/>
           </a:p>
@@ -2704,7 +2705,7 @@
           <a:p>
             <a:fld id="{7F6AC9B7-E31F-47FE-9611-607B9E53C61A}" type="datetimeFigureOut">
               <a:rPr lang="pl-PL" smtClean="0"/>
-              <a:t>15.12.2020</a:t>
+              <a:t>16.12.2020</a:t>
             </a:fld>
             <a:endParaRPr lang="pl-PL"/>
           </a:p>
@@ -2947,7 +2948,7 @@
           <a:p>
             <a:fld id="{7F6AC9B7-E31F-47FE-9611-607B9E53C61A}" type="datetimeFigureOut">
               <a:rPr lang="pl-PL" smtClean="0"/>
-              <a:t>15.12.2020</a:t>
+              <a:t>16.12.2020</a:t>
             </a:fld>
             <a:endParaRPr lang="pl-PL"/>
           </a:p>
@@ -3854,8 +3855,17 @@
             <a:pPr algn="l"/>
             <a:r>
               <a:rPr lang="pl-PL" sz="6400" b="1" dirty="0"/>
-              <a:t>MULTITHREADING</a:t>
+              <a:t>MULTI</a:t>
             </a:r>
+            <a:r>
+              <a:rPr lang="en-US" sz="6400" b="1"/>
+              <a:t>-</a:t>
+            </a:r>
+            <a:r>
+              <a:rPr lang="pl-PL" sz="6400" b="1"/>
+              <a:t>THREADING</a:t>
+            </a:r>
+            <a:endParaRPr lang="pl-PL" sz="6400" b="1" dirty="0"/>
           </a:p>
         </p:txBody>
       </p:sp>
@@ -3895,6 +3905,42 @@
           </a:prstGeom>
         </p:spPr>
       </p:pic>
+      <p:sp>
+        <p:nvSpPr>
+          <p:cNvPr id="3" name="TextBox 2">
+            <a:extLst>
+              <a:ext uri="{FF2B5EF4-FFF2-40B4-BE49-F238E27FC236}">
+                <a16:creationId xmlns:a16="http://schemas.microsoft.com/office/drawing/2014/main" id="{7C6AD62C-C45B-4190-A526-3FA3F1B3AA3E}"/>
+              </a:ext>
+            </a:extLst>
+          </p:cNvPr>
+          <p:cNvSpPr txBox="1"/>
+          <p:nvPr/>
+        </p:nvSpPr>
+        <p:spPr>
+          <a:xfrm>
+            <a:off x="4675925" y="3936363"/>
+            <a:ext cx="1870897" cy="369332"/>
+          </a:xfrm>
+          <a:prstGeom prst="rect">
+            <a:avLst/>
+          </a:prstGeom>
+          <a:noFill/>
+        </p:spPr>
+        <p:txBody>
+          <a:bodyPr wrap="none" rtlCol="0">
+            <a:spAutoFit/>
+          </a:bodyPr>
+          <a:lstStyle/>
+          <a:p>
+            <a:r>
+              <a:rPr lang="en-US" dirty="0"/>
+              <a:t>by Eugene Ryzhov</a:t>
+            </a:r>
+            <a:endParaRPr lang="pl-PL" dirty="0"/>
+          </a:p>
+        </p:txBody>
+      </p:sp>
     </p:spTree>
     <p:extLst>
       <p:ext uri="{BB962C8B-B14F-4D97-AF65-F5344CB8AC3E}">
@@ -4065,6 +4111,1382 @@
                       </p:childTnLst>
                     </p:cTn>
                   </p:par>
+                  <p:par>
+                    <p:cTn id="15" fill="hold">
+                      <p:stCondLst>
+                        <p:cond delay="indefinite"/>
+                      </p:stCondLst>
+                      <p:childTnLst>
+                        <p:par>
+                          <p:cTn id="16" fill="hold">
+                            <p:stCondLst>
+                              <p:cond delay="0"/>
+                            </p:stCondLst>
+                            <p:childTnLst>
+                              <p:par>
+                                <p:cTn id="17" presetID="10" presetClass="entr" presetSubtype="0" fill="hold" grpId="0" nodeType="clickEffect">
+                                  <p:stCondLst>
+                                    <p:cond delay="0"/>
+                                  </p:stCondLst>
+                                  <p:childTnLst>
+                                    <p:set>
+                                      <p:cBhvr>
+                                        <p:cTn id="18" dur="1" fill="hold">
+                                          <p:stCondLst>
+                                            <p:cond delay="0"/>
+                                          </p:stCondLst>
+                                        </p:cTn>
+                                        <p:tgtEl>
+                                          <p:spTgt spid="3"/>
+                                        </p:tgtEl>
+                                        <p:attrNameLst>
+                                          <p:attrName>style.visibility</p:attrName>
+                                        </p:attrNameLst>
+                                      </p:cBhvr>
+                                      <p:to>
+                                        <p:strVal val="visible"/>
+                                      </p:to>
+                                    </p:set>
+                                    <p:animEffect transition="in" filter="fade">
+                                      <p:cBhvr>
+                                        <p:cTn id="19" dur="500"/>
+                                        <p:tgtEl>
+                                          <p:spTgt spid="3"/>
+                                        </p:tgtEl>
+                                      </p:cBhvr>
+                                    </p:animEffect>
+                                  </p:childTnLst>
+                                </p:cTn>
+                              </p:par>
+                            </p:childTnLst>
+                          </p:cTn>
+                        </p:par>
+                      </p:childTnLst>
+                    </p:cTn>
+                  </p:par>
+                </p:childTnLst>
+              </p:cTn>
+              <p:prevCondLst>
+                <p:cond evt="onPrev" delay="0">
+                  <p:tgtEl>
+                    <p:sldTgt/>
+                  </p:tgtEl>
+                </p:cond>
+              </p:prevCondLst>
+              <p:nextCondLst>
+                <p:cond evt="onNext" delay="0">
+                  <p:tgtEl>
+                    <p:sldTgt/>
+                  </p:tgtEl>
+                </p:cond>
+              </p:nextCondLst>
+            </p:seq>
+          </p:childTnLst>
+        </p:cTn>
+      </p:par>
+    </p:tnLst>
+    <p:bldLst>
+      <p:bldP spid="2" grpId="0"/>
+      <p:bldP spid="3" grpId="0"/>
+    </p:bldLst>
+  </p:timing>
+</p:sld>
+</file>
+
+<file path=ppt/slides/slide2.xml><?xml version="1.0" encoding="utf-8"?>
+<p:sld xmlns:a="http://schemas.openxmlformats.org/drawingml/2006/main" xmlns:r="http://schemas.openxmlformats.org/officeDocument/2006/relationships" xmlns:p="http://schemas.openxmlformats.org/presentationml/2006/main">
+  <p:cSld>
+    <p:bg>
+      <p:bgPr>
+        <a:solidFill>
+          <a:srgbClr val="404040"/>
+        </a:solidFill>
+        <a:effectLst/>
+      </p:bgPr>
+    </p:bg>
+    <p:spTree>
+      <p:nvGrpSpPr>
+        <p:cNvPr id="1" name=""/>
+        <p:cNvGrpSpPr/>
+        <p:nvPr/>
+      </p:nvGrpSpPr>
+      <p:grpSpPr>
+        <a:xfrm>
+          <a:off x="0" y="0"/>
+          <a:ext cx="0" cy="0"/>
+          <a:chOff x="0" y="0"/>
+          <a:chExt cx="0" cy="0"/>
+        </a:xfrm>
+      </p:grpSpPr>
+      <p:sp>
+        <p:nvSpPr>
+          <p:cNvPr id="8" name="Rectangle 7">
+            <a:extLst>
+              <a:ext uri="{FF2B5EF4-FFF2-40B4-BE49-F238E27FC236}">
+                <a16:creationId xmlns:a16="http://schemas.microsoft.com/office/drawing/2014/main" id="{EA67B5B4-3A24-436E-B663-1B2EBFF8A0CD}"/>
+              </a:ext>
+              <a:ext uri="{C183D7F6-B498-43B3-948B-1728B52AA6E4}">
+                <adec:decorative xmlns:adec="http://schemas.microsoft.com/office/drawing/2017/decorative" val="1"/>
+              </a:ext>
+            </a:extLst>
+          </p:cNvPr>
+          <p:cNvSpPr>
+            <a:spLocks noGrp="1" noRot="1" noChangeAspect="1" noMove="1" noResize="1" noEditPoints="1" noAdjustHandles="1" noChangeArrowheads="1" noChangeShapeType="1" noTextEdit="1"/>
+          </p:cNvSpPr>
+          <p:nvPr>
+            <p:extLst>
+              <p:ext uri="{386F3935-93C4-4BCD-93E2-E3B085C9AB24}">
+                <p16:designElem xmlns:p16="http://schemas.microsoft.com/office/powerpoint/2015/main" val="1"/>
+              </p:ext>
+            </p:extLst>
+          </p:nvPr>
+        </p:nvSpPr>
+        <p:spPr>
+          <a:xfrm>
+            <a:off x="0" y="-3324"/>
+            <a:ext cx="12192000" cy="6861324"/>
+          </a:xfrm>
+          <a:prstGeom prst="rect">
+            <a:avLst/>
+          </a:prstGeom>
+          <a:solidFill>
+            <a:srgbClr val="404040"/>
+          </a:solidFill>
+          <a:ln>
+            <a:noFill/>
+          </a:ln>
+        </p:spPr>
+        <p:style>
+          <a:lnRef idx="2">
+            <a:schemeClr val="accent1">
+              <a:shade val="50000"/>
+            </a:schemeClr>
+          </a:lnRef>
+          <a:fillRef idx="1">
+            <a:schemeClr val="accent1"/>
+          </a:fillRef>
+          <a:effectRef idx="0">
+            <a:schemeClr val="accent1"/>
+          </a:effectRef>
+          <a:fontRef idx="minor">
+            <a:schemeClr val="lt1"/>
+          </a:fontRef>
+        </p:style>
+        <p:txBody>
+          <a:bodyPr rtlCol="0" anchor="ctr"/>
+          <a:lstStyle/>
+          <a:p>
+            <a:pPr algn="ctr"/>
+            <a:endParaRPr lang="en-US"/>
+          </a:p>
+        </p:txBody>
+      </p:sp>
+      <p:sp>
+        <p:nvSpPr>
+          <p:cNvPr id="10" name="Freeform 13">
+            <a:extLst>
+              <a:ext uri="{FF2B5EF4-FFF2-40B4-BE49-F238E27FC236}">
+                <a16:creationId xmlns:a16="http://schemas.microsoft.com/office/drawing/2014/main" id="{987FDF89-C993-41F4-A1B8-DBAFF16008A9}"/>
+              </a:ext>
+              <a:ext uri="{C183D7F6-B498-43B3-948B-1728B52AA6E4}">
+                <adec:decorative xmlns:adec="http://schemas.microsoft.com/office/drawing/2017/decorative" val="1"/>
+              </a:ext>
+            </a:extLst>
+          </p:cNvPr>
+          <p:cNvSpPr>
+            <a:spLocks noGrp="1" noRot="1" noChangeAspect="1" noMove="1" noResize="1" noEditPoints="1" noAdjustHandles="1" noChangeArrowheads="1" noChangeShapeType="1" noTextEdit="1"/>
+          </p:cNvSpPr>
+          <p:nvPr>
+            <p:extLst>
+              <p:ext uri="{386F3935-93C4-4BCD-93E2-E3B085C9AB24}">
+                <p16:designElem xmlns:p16="http://schemas.microsoft.com/office/powerpoint/2015/main" val="1"/>
+              </p:ext>
+            </p:extLst>
+          </p:nvPr>
+        </p:nvSpPr>
+        <p:spPr>
+          <a:xfrm>
+            <a:off x="0" y="0"/>
+            <a:ext cx="11786754" cy="6858000"/>
+          </a:xfrm>
+          <a:custGeom>
+            <a:avLst/>
+            <a:gdLst>
+              <a:gd name="connsiteX0" fmla="*/ 0 w 11786754"/>
+              <a:gd name="connsiteY0" fmla="*/ 0 h 6858000"/>
+              <a:gd name="connsiteX1" fmla="*/ 8610600 w 11786754"/>
+              <a:gd name="connsiteY1" fmla="*/ 0 h 6858000"/>
+              <a:gd name="connsiteX2" fmla="*/ 11786754 w 11786754"/>
+              <a:gd name="connsiteY2" fmla="*/ 6858000 h 6858000"/>
+              <a:gd name="connsiteX3" fmla="*/ 0 w 11786754"/>
+              <a:gd name="connsiteY3" fmla="*/ 6858000 h 6858000"/>
+            </a:gdLst>
+            <a:ahLst/>
+            <a:cxnLst>
+              <a:cxn ang="0">
+                <a:pos x="connsiteX0" y="connsiteY0"/>
+              </a:cxn>
+              <a:cxn ang="0">
+                <a:pos x="connsiteX1" y="connsiteY1"/>
+              </a:cxn>
+              <a:cxn ang="0">
+                <a:pos x="connsiteX2" y="connsiteY2"/>
+              </a:cxn>
+              <a:cxn ang="0">
+                <a:pos x="connsiteX3" y="connsiteY3"/>
+              </a:cxn>
+            </a:cxnLst>
+            <a:rect l="l" t="t" r="r" b="b"/>
+            <a:pathLst>
+              <a:path w="11786754" h="6858000">
+                <a:moveTo>
+                  <a:pt x="0" y="0"/>
+                </a:moveTo>
+                <a:lnTo>
+                  <a:pt x="8610600" y="0"/>
+                </a:lnTo>
+                <a:lnTo>
+                  <a:pt x="11786754" y="6858000"/>
+                </a:lnTo>
+                <a:lnTo>
+                  <a:pt x="0" y="6858000"/>
+                </a:lnTo>
+                <a:close/>
+              </a:path>
+            </a:pathLst>
+          </a:custGeom>
+          <a:solidFill>
+            <a:srgbClr val="000000">
+              <a:alpha val="29804"/>
+            </a:srgbClr>
+          </a:solidFill>
+          <a:ln>
+            <a:noFill/>
+          </a:ln>
+        </p:spPr>
+        <p:style>
+          <a:lnRef idx="2">
+            <a:schemeClr val="accent1">
+              <a:shade val="50000"/>
+            </a:schemeClr>
+          </a:lnRef>
+          <a:fillRef idx="1">
+            <a:schemeClr val="accent1"/>
+          </a:fillRef>
+          <a:effectRef idx="0">
+            <a:schemeClr val="accent1"/>
+          </a:effectRef>
+          <a:fontRef idx="minor">
+            <a:schemeClr val="lt1"/>
+          </a:fontRef>
+        </p:style>
+        <p:txBody>
+          <a:bodyPr rtlCol="0" anchor="ctr"/>
+          <a:lstStyle/>
+          <a:p>
+            <a:pPr algn="ctr"/>
+            <a:endParaRPr lang="en-US"/>
+          </a:p>
+        </p:txBody>
+      </p:sp>
+      <p:sp>
+        <p:nvSpPr>
+          <p:cNvPr id="12" name="Freeform 11">
+            <a:extLst>
+              <a:ext uri="{FF2B5EF4-FFF2-40B4-BE49-F238E27FC236}">
+                <a16:creationId xmlns:a16="http://schemas.microsoft.com/office/drawing/2014/main" id="{64E585EA-75FD-4025-8270-F66A58A15CDA}"/>
+              </a:ext>
+              <a:ext uri="{C183D7F6-B498-43B3-948B-1728B52AA6E4}">
+                <adec:decorative xmlns:adec="http://schemas.microsoft.com/office/drawing/2017/decorative" val="1"/>
+              </a:ext>
+            </a:extLst>
+          </p:cNvPr>
+          <p:cNvSpPr>
+            <a:spLocks noGrp="1" noRot="1" noChangeAspect="1" noMove="1" noResize="1" noEditPoints="1" noAdjustHandles="1" noChangeArrowheads="1" noChangeShapeType="1" noTextEdit="1"/>
+          </p:cNvSpPr>
+          <p:nvPr>
+            <p:extLst>
+              <p:ext uri="{386F3935-93C4-4BCD-93E2-E3B085C9AB24}">
+                <p16:designElem xmlns:p16="http://schemas.microsoft.com/office/powerpoint/2015/main" val="1"/>
+              </p:ext>
+            </p:extLst>
+          </p:nvPr>
+        </p:nvSpPr>
+        <p:spPr>
+          <a:xfrm>
+            <a:off x="0" y="0"/>
+            <a:ext cx="3581400" cy="6858000"/>
+          </a:xfrm>
+          <a:custGeom>
+            <a:avLst/>
+            <a:gdLst>
+              <a:gd name="connsiteX0" fmla="*/ 0 w 3581400"/>
+              <a:gd name="connsiteY0" fmla="*/ 0 h 6858000"/>
+              <a:gd name="connsiteX1" fmla="*/ 405246 w 3581400"/>
+              <a:gd name="connsiteY1" fmla="*/ 0 h 6858000"/>
+              <a:gd name="connsiteX2" fmla="*/ 3581400 w 3581400"/>
+              <a:gd name="connsiteY2" fmla="*/ 6858000 h 6858000"/>
+              <a:gd name="connsiteX3" fmla="*/ 0 w 3581400"/>
+              <a:gd name="connsiteY3" fmla="*/ 6858000 h 6858000"/>
+            </a:gdLst>
+            <a:ahLst/>
+            <a:cxnLst>
+              <a:cxn ang="0">
+                <a:pos x="connsiteX0" y="connsiteY0"/>
+              </a:cxn>
+              <a:cxn ang="0">
+                <a:pos x="connsiteX1" y="connsiteY1"/>
+              </a:cxn>
+              <a:cxn ang="0">
+                <a:pos x="connsiteX2" y="connsiteY2"/>
+              </a:cxn>
+              <a:cxn ang="0">
+                <a:pos x="connsiteX3" y="connsiteY3"/>
+              </a:cxn>
+            </a:cxnLst>
+            <a:rect l="l" t="t" r="r" b="b"/>
+            <a:pathLst>
+              <a:path w="3581400" h="6858000">
+                <a:moveTo>
+                  <a:pt x="0" y="0"/>
+                </a:moveTo>
+                <a:lnTo>
+                  <a:pt x="405246" y="0"/>
+                </a:lnTo>
+                <a:lnTo>
+                  <a:pt x="3581400" y="6858000"/>
+                </a:lnTo>
+                <a:lnTo>
+                  <a:pt x="0" y="6858000"/>
+                </a:lnTo>
+                <a:close/>
+              </a:path>
+            </a:pathLst>
+          </a:custGeom>
+          <a:solidFill>
+            <a:srgbClr val="000000">
+              <a:alpha val="29804"/>
+            </a:srgbClr>
+          </a:solidFill>
+          <a:ln>
+            <a:noFill/>
+          </a:ln>
+        </p:spPr>
+        <p:style>
+          <a:lnRef idx="2">
+            <a:schemeClr val="accent1">
+              <a:shade val="50000"/>
+            </a:schemeClr>
+          </a:lnRef>
+          <a:fillRef idx="1">
+            <a:schemeClr val="accent1"/>
+          </a:fillRef>
+          <a:effectRef idx="0">
+            <a:schemeClr val="accent1"/>
+          </a:effectRef>
+          <a:fontRef idx="minor">
+            <a:schemeClr val="lt1"/>
+          </a:fontRef>
+        </p:style>
+        <p:txBody>
+          <a:bodyPr wrap="square" rtlCol="0" anchor="ctr">
+            <a:noAutofit/>
+          </a:bodyPr>
+          <a:lstStyle/>
+          <a:p>
+            <a:pPr algn="ctr"/>
+            <a:endParaRPr lang="en-US"/>
+          </a:p>
+        </p:txBody>
+      </p:sp>
+      <p:sp>
+        <p:nvSpPr>
+          <p:cNvPr id="2" name="Title 1">
+            <a:extLst>
+              <a:ext uri="{FF2B5EF4-FFF2-40B4-BE49-F238E27FC236}">
+                <a16:creationId xmlns:a16="http://schemas.microsoft.com/office/drawing/2014/main" id="{C5BDEEA4-A3B5-4BB2-85A5-E75EE3AB277E}"/>
+              </a:ext>
+            </a:extLst>
+          </p:cNvPr>
+          <p:cNvSpPr>
+            <a:spLocks noGrp="1"/>
+          </p:cNvSpPr>
+          <p:nvPr>
+            <p:ph type="title"/>
+          </p:nvPr>
+        </p:nvSpPr>
+        <p:spPr>
+          <a:xfrm>
+            <a:off x="833002" y="365125"/>
+            <a:ext cx="10520702" cy="1325563"/>
+          </a:xfrm>
+        </p:spPr>
+        <p:txBody>
+          <a:bodyPr>
+            <a:normAutofit/>
+          </a:bodyPr>
+          <a:lstStyle/>
+          <a:p>
+            <a:r>
+              <a:rPr lang="en-US" dirty="0">
+                <a:solidFill>
+                  <a:srgbClr val="FFFFFF"/>
+                </a:solidFill>
+              </a:rPr>
+              <a:t>In this course you’ll learn:</a:t>
+            </a:r>
+            <a:endParaRPr lang="pl-PL" dirty="0">
+              <a:solidFill>
+                <a:srgbClr val="FFFFFF"/>
+              </a:solidFill>
+            </a:endParaRPr>
+          </a:p>
+        </p:txBody>
+      </p:sp>
+      <p:sp>
+        <p:nvSpPr>
+          <p:cNvPr id="3" name="Content Placeholder 2">
+            <a:extLst>
+              <a:ext uri="{FF2B5EF4-FFF2-40B4-BE49-F238E27FC236}">
+                <a16:creationId xmlns:a16="http://schemas.microsoft.com/office/drawing/2014/main" id="{F2344D30-DE93-4101-99DF-9D66852931D1}"/>
+              </a:ext>
+            </a:extLst>
+          </p:cNvPr>
+          <p:cNvSpPr>
+            <a:spLocks noGrp="1"/>
+          </p:cNvSpPr>
+          <p:nvPr>
+            <p:ph idx="1"/>
+          </p:nvPr>
+        </p:nvSpPr>
+        <p:spPr>
+          <a:xfrm>
+            <a:off x="833002" y="1776794"/>
+            <a:ext cx="10515598" cy="4154361"/>
+          </a:xfrm>
+        </p:spPr>
+        <p:txBody>
+          <a:bodyPr>
+            <a:normAutofit/>
+          </a:bodyPr>
+          <a:lstStyle/>
+          <a:p>
+            <a:r>
+              <a:rPr lang="en-US" sz="2400" dirty="0">
+                <a:solidFill>
+                  <a:srgbClr val="FFFFFF"/>
+                </a:solidFill>
+              </a:rPr>
+              <a:t>What is thread</a:t>
+            </a:r>
+          </a:p>
+          <a:p>
+            <a:r>
+              <a:rPr lang="en-US" sz="2400" dirty="0">
+                <a:solidFill>
+                  <a:srgbClr val="FFFFFF"/>
+                </a:solidFill>
+              </a:rPr>
+              <a:t>How multi-threading is working</a:t>
+            </a:r>
+          </a:p>
+          <a:p>
+            <a:r>
+              <a:rPr lang="en-US" sz="2400" dirty="0">
+                <a:solidFill>
+                  <a:srgbClr val="FFFFFF"/>
+                </a:solidFill>
+              </a:rPr>
+              <a:t>What is the difference between Process and Thread</a:t>
+            </a:r>
+          </a:p>
+          <a:p>
+            <a:r>
+              <a:rPr lang="en-US" sz="2400" dirty="0">
+                <a:solidFill>
+                  <a:srgbClr val="FFFFFF"/>
+                </a:solidFill>
+              </a:rPr>
+              <a:t>How to start and stop the threads in C#</a:t>
+            </a:r>
+          </a:p>
+          <a:p>
+            <a:r>
+              <a:rPr lang="en-US" sz="2400" dirty="0">
+                <a:solidFill>
+                  <a:srgbClr val="FFFFFF"/>
+                </a:solidFill>
+              </a:rPr>
+              <a:t>Types of the threads, their priorities and properties</a:t>
+            </a:r>
+          </a:p>
+          <a:p>
+            <a:r>
+              <a:rPr lang="en-US" sz="2400" dirty="0">
+                <a:solidFill>
+                  <a:srgbClr val="FFFFFF"/>
+                </a:solidFill>
+              </a:rPr>
+              <a:t>What is the concurrency and what synchronization primitives are there</a:t>
+            </a:r>
+          </a:p>
+          <a:p>
+            <a:r>
+              <a:rPr lang="en-US" sz="2400" dirty="0">
+                <a:solidFill>
+                  <a:srgbClr val="FFFFFF"/>
+                </a:solidFill>
+              </a:rPr>
+              <a:t>What is Deadlock and how to avoid them</a:t>
+            </a:r>
+          </a:p>
+          <a:p>
+            <a:endParaRPr lang="pl-PL" sz="2400" dirty="0">
+              <a:solidFill>
+                <a:srgbClr val="FFFFFF"/>
+              </a:solidFill>
+            </a:endParaRPr>
+          </a:p>
+        </p:txBody>
+      </p:sp>
+    </p:spTree>
+    <p:extLst>
+      <p:ext uri="{BB962C8B-B14F-4D97-AF65-F5344CB8AC3E}">
+        <p14:creationId xmlns:p14="http://schemas.microsoft.com/office/powerpoint/2010/main" val="1409717813"/>
+      </p:ext>
+    </p:extLst>
+  </p:cSld>
+  <p:clrMapOvr>
+    <a:overrideClrMapping bg1="dk1" tx1="lt1" bg2="dk2" tx2="lt2" accent1="accent1" accent2="accent2" accent3="accent3" accent4="accent4" accent5="accent5" accent6="accent6" hlink="hlink" folHlink="folHlink"/>
+  </p:clrMapOvr>
+  <p:timing>
+    <p:tnLst>
+      <p:par>
+        <p:cTn id="1" dur="indefinite" restart="never" nodeType="tmRoot">
+          <p:childTnLst>
+            <p:seq concurrent="1" nextAc="seek">
+              <p:cTn id="2" dur="indefinite" nodeType="mainSeq">
+                <p:childTnLst>
+                  <p:par>
+                    <p:cTn id="3" fill="hold">
+                      <p:stCondLst>
+                        <p:cond delay="indefinite"/>
+                      </p:stCondLst>
+                      <p:childTnLst>
+                        <p:par>
+                          <p:cTn id="4" fill="hold">
+                            <p:stCondLst>
+                              <p:cond delay="0"/>
+                            </p:stCondLst>
+                            <p:childTnLst>
+                              <p:par>
+                                <p:cTn id="5" presetID="42" presetClass="entr" presetSubtype="0" fill="hold" grpId="0" nodeType="clickEffect">
+                                  <p:stCondLst>
+                                    <p:cond delay="0"/>
+                                  </p:stCondLst>
+                                  <p:childTnLst>
+                                    <p:set>
+                                      <p:cBhvr>
+                                        <p:cTn id="6" dur="1" fill="hold">
+                                          <p:stCondLst>
+                                            <p:cond delay="0"/>
+                                          </p:stCondLst>
+                                        </p:cTn>
+                                        <p:tgtEl>
+                                          <p:spTgt spid="2"/>
+                                        </p:tgtEl>
+                                        <p:attrNameLst>
+                                          <p:attrName>style.visibility</p:attrName>
+                                        </p:attrNameLst>
+                                      </p:cBhvr>
+                                      <p:to>
+                                        <p:strVal val="visible"/>
+                                      </p:to>
+                                    </p:set>
+                                    <p:animEffect transition="in" filter="fade">
+                                      <p:cBhvr>
+                                        <p:cTn id="7" dur="1000"/>
+                                        <p:tgtEl>
+                                          <p:spTgt spid="2"/>
+                                        </p:tgtEl>
+                                      </p:cBhvr>
+                                    </p:animEffect>
+                                    <p:anim calcmode="lin" valueType="num">
+                                      <p:cBhvr>
+                                        <p:cTn id="8" dur="1000" fill="hold"/>
+                                        <p:tgtEl>
+                                          <p:spTgt spid="2"/>
+                                        </p:tgtEl>
+                                        <p:attrNameLst>
+                                          <p:attrName>ppt_x</p:attrName>
+                                        </p:attrNameLst>
+                                      </p:cBhvr>
+                                      <p:tavLst>
+                                        <p:tav tm="0">
+                                          <p:val>
+                                            <p:strVal val="#ppt_x"/>
+                                          </p:val>
+                                        </p:tav>
+                                        <p:tav tm="100000">
+                                          <p:val>
+                                            <p:strVal val="#ppt_x"/>
+                                          </p:val>
+                                        </p:tav>
+                                      </p:tavLst>
+                                    </p:anim>
+                                    <p:anim calcmode="lin" valueType="num">
+                                      <p:cBhvr>
+                                        <p:cTn id="9" dur="1000" fill="hold"/>
+                                        <p:tgtEl>
+                                          <p:spTgt spid="2"/>
+                                        </p:tgtEl>
+                                        <p:attrNameLst>
+                                          <p:attrName>ppt_y</p:attrName>
+                                        </p:attrNameLst>
+                                      </p:cBhvr>
+                                      <p:tavLst>
+                                        <p:tav tm="0">
+                                          <p:val>
+                                            <p:strVal val="#ppt_y+.1"/>
+                                          </p:val>
+                                        </p:tav>
+                                        <p:tav tm="100000">
+                                          <p:val>
+                                            <p:strVal val="#ppt_y"/>
+                                          </p:val>
+                                        </p:tav>
+                                      </p:tavLst>
+                                    </p:anim>
+                                  </p:childTnLst>
+                                </p:cTn>
+                              </p:par>
+                            </p:childTnLst>
+                          </p:cTn>
+                        </p:par>
+                      </p:childTnLst>
+                    </p:cTn>
+                  </p:par>
+                  <p:par>
+                    <p:cTn id="10" fill="hold">
+                      <p:stCondLst>
+                        <p:cond delay="indefinite"/>
+                      </p:stCondLst>
+                      <p:childTnLst>
+                        <p:par>
+                          <p:cTn id="11" fill="hold">
+                            <p:stCondLst>
+                              <p:cond delay="0"/>
+                            </p:stCondLst>
+                            <p:childTnLst>
+                              <p:par>
+                                <p:cTn id="12" presetID="2" presetClass="entr" presetSubtype="4" fill="hold" nodeType="clickEffect">
+                                  <p:stCondLst>
+                                    <p:cond delay="0"/>
+                                  </p:stCondLst>
+                                  <p:childTnLst>
+                                    <p:set>
+                                      <p:cBhvr>
+                                        <p:cTn id="13" dur="1" fill="hold">
+                                          <p:stCondLst>
+                                            <p:cond delay="0"/>
+                                          </p:stCondLst>
+                                        </p:cTn>
+                                        <p:tgtEl>
+                                          <p:spTgt spid="3">
+                                            <p:txEl>
+                                              <p:pRg st="0" end="0"/>
+                                            </p:txEl>
+                                          </p:spTgt>
+                                        </p:tgtEl>
+                                        <p:attrNameLst>
+                                          <p:attrName>style.visibility</p:attrName>
+                                        </p:attrNameLst>
+                                      </p:cBhvr>
+                                      <p:to>
+                                        <p:strVal val="visible"/>
+                                      </p:to>
+                                    </p:set>
+                                    <p:anim calcmode="lin" valueType="num">
+                                      <p:cBhvr additive="base">
+                                        <p:cTn id="14" dur="500" fill="hold"/>
+                                        <p:tgtEl>
+                                          <p:spTgt spid="3">
+                                            <p:txEl>
+                                              <p:pRg st="0" end="0"/>
+                                            </p:txEl>
+                                          </p:spTgt>
+                                        </p:tgtEl>
+                                        <p:attrNameLst>
+                                          <p:attrName>ppt_x</p:attrName>
+                                        </p:attrNameLst>
+                                      </p:cBhvr>
+                                      <p:tavLst>
+                                        <p:tav tm="0">
+                                          <p:val>
+                                            <p:strVal val="#ppt_x"/>
+                                          </p:val>
+                                        </p:tav>
+                                        <p:tav tm="100000">
+                                          <p:val>
+                                            <p:strVal val="#ppt_x"/>
+                                          </p:val>
+                                        </p:tav>
+                                      </p:tavLst>
+                                    </p:anim>
+                                    <p:anim calcmode="lin" valueType="num">
+                                      <p:cBhvr additive="base">
+                                        <p:cTn id="15" dur="500" fill="hold"/>
+                                        <p:tgtEl>
+                                          <p:spTgt spid="3">
+                                            <p:txEl>
+                                              <p:pRg st="0" end="0"/>
+                                            </p:txEl>
+                                          </p:spTgt>
+                                        </p:tgtEl>
+                                        <p:attrNameLst>
+                                          <p:attrName>ppt_y</p:attrName>
+                                        </p:attrNameLst>
+                                      </p:cBhvr>
+                                      <p:tavLst>
+                                        <p:tav tm="0">
+                                          <p:val>
+                                            <p:strVal val="1+#ppt_h/2"/>
+                                          </p:val>
+                                        </p:tav>
+                                        <p:tav tm="100000">
+                                          <p:val>
+                                            <p:strVal val="#ppt_y"/>
+                                          </p:val>
+                                        </p:tav>
+                                      </p:tavLst>
+                                    </p:anim>
+                                  </p:childTnLst>
+                                </p:cTn>
+                              </p:par>
+                            </p:childTnLst>
+                          </p:cTn>
+                        </p:par>
+                      </p:childTnLst>
+                    </p:cTn>
+                  </p:par>
+                  <p:par>
+                    <p:cTn id="16" fill="hold">
+                      <p:stCondLst>
+                        <p:cond delay="indefinite"/>
+                      </p:stCondLst>
+                      <p:childTnLst>
+                        <p:par>
+                          <p:cTn id="17" fill="hold">
+                            <p:stCondLst>
+                              <p:cond delay="0"/>
+                            </p:stCondLst>
+                            <p:childTnLst>
+                              <p:par>
+                                <p:cTn id="18" presetID="2" presetClass="entr" presetSubtype="4" fill="hold" nodeType="clickEffect">
+                                  <p:stCondLst>
+                                    <p:cond delay="0"/>
+                                  </p:stCondLst>
+                                  <p:childTnLst>
+                                    <p:set>
+                                      <p:cBhvr>
+                                        <p:cTn id="19" dur="1" fill="hold">
+                                          <p:stCondLst>
+                                            <p:cond delay="0"/>
+                                          </p:stCondLst>
+                                        </p:cTn>
+                                        <p:tgtEl>
+                                          <p:spTgt spid="3">
+                                            <p:txEl>
+                                              <p:pRg st="1" end="1"/>
+                                            </p:txEl>
+                                          </p:spTgt>
+                                        </p:tgtEl>
+                                        <p:attrNameLst>
+                                          <p:attrName>style.visibility</p:attrName>
+                                        </p:attrNameLst>
+                                      </p:cBhvr>
+                                      <p:to>
+                                        <p:strVal val="visible"/>
+                                      </p:to>
+                                    </p:set>
+                                    <p:anim calcmode="lin" valueType="num">
+                                      <p:cBhvr additive="base">
+                                        <p:cTn id="20" dur="500" fill="hold"/>
+                                        <p:tgtEl>
+                                          <p:spTgt spid="3">
+                                            <p:txEl>
+                                              <p:pRg st="1" end="1"/>
+                                            </p:txEl>
+                                          </p:spTgt>
+                                        </p:tgtEl>
+                                        <p:attrNameLst>
+                                          <p:attrName>ppt_x</p:attrName>
+                                        </p:attrNameLst>
+                                      </p:cBhvr>
+                                      <p:tavLst>
+                                        <p:tav tm="0">
+                                          <p:val>
+                                            <p:strVal val="#ppt_x"/>
+                                          </p:val>
+                                        </p:tav>
+                                        <p:tav tm="100000">
+                                          <p:val>
+                                            <p:strVal val="#ppt_x"/>
+                                          </p:val>
+                                        </p:tav>
+                                      </p:tavLst>
+                                    </p:anim>
+                                    <p:anim calcmode="lin" valueType="num">
+                                      <p:cBhvr additive="base">
+                                        <p:cTn id="21" dur="500" fill="hold"/>
+                                        <p:tgtEl>
+                                          <p:spTgt spid="3">
+                                            <p:txEl>
+                                              <p:pRg st="1" end="1"/>
+                                            </p:txEl>
+                                          </p:spTgt>
+                                        </p:tgtEl>
+                                        <p:attrNameLst>
+                                          <p:attrName>ppt_y</p:attrName>
+                                        </p:attrNameLst>
+                                      </p:cBhvr>
+                                      <p:tavLst>
+                                        <p:tav tm="0">
+                                          <p:val>
+                                            <p:strVal val="1+#ppt_h/2"/>
+                                          </p:val>
+                                        </p:tav>
+                                        <p:tav tm="100000">
+                                          <p:val>
+                                            <p:strVal val="#ppt_y"/>
+                                          </p:val>
+                                        </p:tav>
+                                      </p:tavLst>
+                                    </p:anim>
+                                  </p:childTnLst>
+                                </p:cTn>
+                              </p:par>
+                            </p:childTnLst>
+                          </p:cTn>
+                        </p:par>
+                      </p:childTnLst>
+                    </p:cTn>
+                  </p:par>
+                  <p:par>
+                    <p:cTn id="22" fill="hold">
+                      <p:stCondLst>
+                        <p:cond delay="indefinite"/>
+                      </p:stCondLst>
+                      <p:childTnLst>
+                        <p:par>
+                          <p:cTn id="23" fill="hold">
+                            <p:stCondLst>
+                              <p:cond delay="0"/>
+                            </p:stCondLst>
+                            <p:childTnLst>
+                              <p:par>
+                                <p:cTn id="24" presetID="2" presetClass="entr" presetSubtype="4" fill="hold" nodeType="clickEffect">
+                                  <p:stCondLst>
+                                    <p:cond delay="0"/>
+                                  </p:stCondLst>
+                                  <p:childTnLst>
+                                    <p:set>
+                                      <p:cBhvr>
+                                        <p:cTn id="25" dur="1" fill="hold">
+                                          <p:stCondLst>
+                                            <p:cond delay="0"/>
+                                          </p:stCondLst>
+                                        </p:cTn>
+                                        <p:tgtEl>
+                                          <p:spTgt spid="3">
+                                            <p:txEl>
+                                              <p:pRg st="2" end="2"/>
+                                            </p:txEl>
+                                          </p:spTgt>
+                                        </p:tgtEl>
+                                        <p:attrNameLst>
+                                          <p:attrName>style.visibility</p:attrName>
+                                        </p:attrNameLst>
+                                      </p:cBhvr>
+                                      <p:to>
+                                        <p:strVal val="visible"/>
+                                      </p:to>
+                                    </p:set>
+                                    <p:anim calcmode="lin" valueType="num">
+                                      <p:cBhvr additive="base">
+                                        <p:cTn id="26" dur="500" fill="hold"/>
+                                        <p:tgtEl>
+                                          <p:spTgt spid="3">
+                                            <p:txEl>
+                                              <p:pRg st="2" end="2"/>
+                                            </p:txEl>
+                                          </p:spTgt>
+                                        </p:tgtEl>
+                                        <p:attrNameLst>
+                                          <p:attrName>ppt_x</p:attrName>
+                                        </p:attrNameLst>
+                                      </p:cBhvr>
+                                      <p:tavLst>
+                                        <p:tav tm="0">
+                                          <p:val>
+                                            <p:strVal val="#ppt_x"/>
+                                          </p:val>
+                                        </p:tav>
+                                        <p:tav tm="100000">
+                                          <p:val>
+                                            <p:strVal val="#ppt_x"/>
+                                          </p:val>
+                                        </p:tav>
+                                      </p:tavLst>
+                                    </p:anim>
+                                    <p:anim calcmode="lin" valueType="num">
+                                      <p:cBhvr additive="base">
+                                        <p:cTn id="27" dur="500" fill="hold"/>
+                                        <p:tgtEl>
+                                          <p:spTgt spid="3">
+                                            <p:txEl>
+                                              <p:pRg st="2" end="2"/>
+                                            </p:txEl>
+                                          </p:spTgt>
+                                        </p:tgtEl>
+                                        <p:attrNameLst>
+                                          <p:attrName>ppt_y</p:attrName>
+                                        </p:attrNameLst>
+                                      </p:cBhvr>
+                                      <p:tavLst>
+                                        <p:tav tm="0">
+                                          <p:val>
+                                            <p:strVal val="1+#ppt_h/2"/>
+                                          </p:val>
+                                        </p:tav>
+                                        <p:tav tm="100000">
+                                          <p:val>
+                                            <p:strVal val="#ppt_y"/>
+                                          </p:val>
+                                        </p:tav>
+                                      </p:tavLst>
+                                    </p:anim>
+                                  </p:childTnLst>
+                                </p:cTn>
+                              </p:par>
+                            </p:childTnLst>
+                          </p:cTn>
+                        </p:par>
+                      </p:childTnLst>
+                    </p:cTn>
+                  </p:par>
+                  <p:par>
+                    <p:cTn id="28" fill="hold">
+                      <p:stCondLst>
+                        <p:cond delay="indefinite"/>
+                      </p:stCondLst>
+                      <p:childTnLst>
+                        <p:par>
+                          <p:cTn id="29" fill="hold">
+                            <p:stCondLst>
+                              <p:cond delay="0"/>
+                            </p:stCondLst>
+                            <p:childTnLst>
+                              <p:par>
+                                <p:cTn id="30" presetID="2" presetClass="entr" presetSubtype="4" fill="hold" nodeType="clickEffect">
+                                  <p:stCondLst>
+                                    <p:cond delay="0"/>
+                                  </p:stCondLst>
+                                  <p:childTnLst>
+                                    <p:set>
+                                      <p:cBhvr>
+                                        <p:cTn id="31" dur="1" fill="hold">
+                                          <p:stCondLst>
+                                            <p:cond delay="0"/>
+                                          </p:stCondLst>
+                                        </p:cTn>
+                                        <p:tgtEl>
+                                          <p:spTgt spid="3">
+                                            <p:txEl>
+                                              <p:pRg st="3" end="3"/>
+                                            </p:txEl>
+                                          </p:spTgt>
+                                        </p:tgtEl>
+                                        <p:attrNameLst>
+                                          <p:attrName>style.visibility</p:attrName>
+                                        </p:attrNameLst>
+                                      </p:cBhvr>
+                                      <p:to>
+                                        <p:strVal val="visible"/>
+                                      </p:to>
+                                    </p:set>
+                                    <p:anim calcmode="lin" valueType="num">
+                                      <p:cBhvr additive="base">
+                                        <p:cTn id="32" dur="500" fill="hold"/>
+                                        <p:tgtEl>
+                                          <p:spTgt spid="3">
+                                            <p:txEl>
+                                              <p:pRg st="3" end="3"/>
+                                            </p:txEl>
+                                          </p:spTgt>
+                                        </p:tgtEl>
+                                        <p:attrNameLst>
+                                          <p:attrName>ppt_x</p:attrName>
+                                        </p:attrNameLst>
+                                      </p:cBhvr>
+                                      <p:tavLst>
+                                        <p:tav tm="0">
+                                          <p:val>
+                                            <p:strVal val="#ppt_x"/>
+                                          </p:val>
+                                        </p:tav>
+                                        <p:tav tm="100000">
+                                          <p:val>
+                                            <p:strVal val="#ppt_x"/>
+                                          </p:val>
+                                        </p:tav>
+                                      </p:tavLst>
+                                    </p:anim>
+                                    <p:anim calcmode="lin" valueType="num">
+                                      <p:cBhvr additive="base">
+                                        <p:cTn id="33" dur="500" fill="hold"/>
+                                        <p:tgtEl>
+                                          <p:spTgt spid="3">
+                                            <p:txEl>
+                                              <p:pRg st="3" end="3"/>
+                                            </p:txEl>
+                                          </p:spTgt>
+                                        </p:tgtEl>
+                                        <p:attrNameLst>
+                                          <p:attrName>ppt_y</p:attrName>
+                                        </p:attrNameLst>
+                                      </p:cBhvr>
+                                      <p:tavLst>
+                                        <p:tav tm="0">
+                                          <p:val>
+                                            <p:strVal val="1+#ppt_h/2"/>
+                                          </p:val>
+                                        </p:tav>
+                                        <p:tav tm="100000">
+                                          <p:val>
+                                            <p:strVal val="#ppt_y"/>
+                                          </p:val>
+                                        </p:tav>
+                                      </p:tavLst>
+                                    </p:anim>
+                                  </p:childTnLst>
+                                </p:cTn>
+                              </p:par>
+                            </p:childTnLst>
+                          </p:cTn>
+                        </p:par>
+                      </p:childTnLst>
+                    </p:cTn>
+                  </p:par>
+                  <p:par>
+                    <p:cTn id="34" fill="hold">
+                      <p:stCondLst>
+                        <p:cond delay="indefinite"/>
+                      </p:stCondLst>
+                      <p:childTnLst>
+                        <p:par>
+                          <p:cTn id="35" fill="hold">
+                            <p:stCondLst>
+                              <p:cond delay="0"/>
+                            </p:stCondLst>
+                            <p:childTnLst>
+                              <p:par>
+                                <p:cTn id="36" presetID="2" presetClass="entr" presetSubtype="4" fill="hold" nodeType="clickEffect">
+                                  <p:stCondLst>
+                                    <p:cond delay="0"/>
+                                  </p:stCondLst>
+                                  <p:childTnLst>
+                                    <p:set>
+                                      <p:cBhvr>
+                                        <p:cTn id="37" dur="1" fill="hold">
+                                          <p:stCondLst>
+                                            <p:cond delay="0"/>
+                                          </p:stCondLst>
+                                        </p:cTn>
+                                        <p:tgtEl>
+                                          <p:spTgt spid="3">
+                                            <p:txEl>
+                                              <p:pRg st="4" end="4"/>
+                                            </p:txEl>
+                                          </p:spTgt>
+                                        </p:tgtEl>
+                                        <p:attrNameLst>
+                                          <p:attrName>style.visibility</p:attrName>
+                                        </p:attrNameLst>
+                                      </p:cBhvr>
+                                      <p:to>
+                                        <p:strVal val="visible"/>
+                                      </p:to>
+                                    </p:set>
+                                    <p:anim calcmode="lin" valueType="num">
+                                      <p:cBhvr additive="base">
+                                        <p:cTn id="38" dur="500" fill="hold"/>
+                                        <p:tgtEl>
+                                          <p:spTgt spid="3">
+                                            <p:txEl>
+                                              <p:pRg st="4" end="4"/>
+                                            </p:txEl>
+                                          </p:spTgt>
+                                        </p:tgtEl>
+                                        <p:attrNameLst>
+                                          <p:attrName>ppt_x</p:attrName>
+                                        </p:attrNameLst>
+                                      </p:cBhvr>
+                                      <p:tavLst>
+                                        <p:tav tm="0">
+                                          <p:val>
+                                            <p:strVal val="#ppt_x"/>
+                                          </p:val>
+                                        </p:tav>
+                                        <p:tav tm="100000">
+                                          <p:val>
+                                            <p:strVal val="#ppt_x"/>
+                                          </p:val>
+                                        </p:tav>
+                                      </p:tavLst>
+                                    </p:anim>
+                                    <p:anim calcmode="lin" valueType="num">
+                                      <p:cBhvr additive="base">
+                                        <p:cTn id="39" dur="500" fill="hold"/>
+                                        <p:tgtEl>
+                                          <p:spTgt spid="3">
+                                            <p:txEl>
+                                              <p:pRg st="4" end="4"/>
+                                            </p:txEl>
+                                          </p:spTgt>
+                                        </p:tgtEl>
+                                        <p:attrNameLst>
+                                          <p:attrName>ppt_y</p:attrName>
+                                        </p:attrNameLst>
+                                      </p:cBhvr>
+                                      <p:tavLst>
+                                        <p:tav tm="0">
+                                          <p:val>
+                                            <p:strVal val="1+#ppt_h/2"/>
+                                          </p:val>
+                                        </p:tav>
+                                        <p:tav tm="100000">
+                                          <p:val>
+                                            <p:strVal val="#ppt_y"/>
+                                          </p:val>
+                                        </p:tav>
+                                      </p:tavLst>
+                                    </p:anim>
+                                  </p:childTnLst>
+                                </p:cTn>
+                              </p:par>
+                            </p:childTnLst>
+                          </p:cTn>
+                        </p:par>
+                      </p:childTnLst>
+                    </p:cTn>
+                  </p:par>
+                  <p:par>
+                    <p:cTn id="40" fill="hold">
+                      <p:stCondLst>
+                        <p:cond delay="indefinite"/>
+                      </p:stCondLst>
+                      <p:childTnLst>
+                        <p:par>
+                          <p:cTn id="41" fill="hold">
+                            <p:stCondLst>
+                              <p:cond delay="0"/>
+                            </p:stCondLst>
+                            <p:childTnLst>
+                              <p:par>
+                                <p:cTn id="42" presetID="2" presetClass="entr" presetSubtype="4" fill="hold" nodeType="clickEffect">
+                                  <p:stCondLst>
+                                    <p:cond delay="0"/>
+                                  </p:stCondLst>
+                                  <p:childTnLst>
+                                    <p:set>
+                                      <p:cBhvr>
+                                        <p:cTn id="43" dur="1" fill="hold">
+                                          <p:stCondLst>
+                                            <p:cond delay="0"/>
+                                          </p:stCondLst>
+                                        </p:cTn>
+                                        <p:tgtEl>
+                                          <p:spTgt spid="3">
+                                            <p:txEl>
+                                              <p:pRg st="5" end="5"/>
+                                            </p:txEl>
+                                          </p:spTgt>
+                                        </p:tgtEl>
+                                        <p:attrNameLst>
+                                          <p:attrName>style.visibility</p:attrName>
+                                        </p:attrNameLst>
+                                      </p:cBhvr>
+                                      <p:to>
+                                        <p:strVal val="visible"/>
+                                      </p:to>
+                                    </p:set>
+                                    <p:anim calcmode="lin" valueType="num">
+                                      <p:cBhvr additive="base">
+                                        <p:cTn id="44" dur="500" fill="hold"/>
+                                        <p:tgtEl>
+                                          <p:spTgt spid="3">
+                                            <p:txEl>
+                                              <p:pRg st="5" end="5"/>
+                                            </p:txEl>
+                                          </p:spTgt>
+                                        </p:tgtEl>
+                                        <p:attrNameLst>
+                                          <p:attrName>ppt_x</p:attrName>
+                                        </p:attrNameLst>
+                                      </p:cBhvr>
+                                      <p:tavLst>
+                                        <p:tav tm="0">
+                                          <p:val>
+                                            <p:strVal val="#ppt_x"/>
+                                          </p:val>
+                                        </p:tav>
+                                        <p:tav tm="100000">
+                                          <p:val>
+                                            <p:strVal val="#ppt_x"/>
+                                          </p:val>
+                                        </p:tav>
+                                      </p:tavLst>
+                                    </p:anim>
+                                    <p:anim calcmode="lin" valueType="num">
+                                      <p:cBhvr additive="base">
+                                        <p:cTn id="45" dur="500" fill="hold"/>
+                                        <p:tgtEl>
+                                          <p:spTgt spid="3">
+                                            <p:txEl>
+                                              <p:pRg st="5" end="5"/>
+                                            </p:txEl>
+                                          </p:spTgt>
+                                        </p:tgtEl>
+                                        <p:attrNameLst>
+                                          <p:attrName>ppt_y</p:attrName>
+                                        </p:attrNameLst>
+                                      </p:cBhvr>
+                                      <p:tavLst>
+                                        <p:tav tm="0">
+                                          <p:val>
+                                            <p:strVal val="1+#ppt_h/2"/>
+                                          </p:val>
+                                        </p:tav>
+                                        <p:tav tm="100000">
+                                          <p:val>
+                                            <p:strVal val="#ppt_y"/>
+                                          </p:val>
+                                        </p:tav>
+                                      </p:tavLst>
+                                    </p:anim>
+                                  </p:childTnLst>
+                                </p:cTn>
+                              </p:par>
+                            </p:childTnLst>
+                          </p:cTn>
+                        </p:par>
+                      </p:childTnLst>
+                    </p:cTn>
+                  </p:par>
+                  <p:par>
+                    <p:cTn id="46" fill="hold">
+                      <p:stCondLst>
+                        <p:cond delay="indefinite"/>
+                      </p:stCondLst>
+                      <p:childTnLst>
+                        <p:par>
+                          <p:cTn id="47" fill="hold">
+                            <p:stCondLst>
+                              <p:cond delay="0"/>
+                            </p:stCondLst>
+                            <p:childTnLst>
+                              <p:par>
+                                <p:cTn id="48" presetID="2" presetClass="entr" presetSubtype="4" fill="hold" nodeType="clickEffect">
+                                  <p:stCondLst>
+                                    <p:cond delay="0"/>
+                                  </p:stCondLst>
+                                  <p:childTnLst>
+                                    <p:set>
+                                      <p:cBhvr>
+                                        <p:cTn id="49" dur="1" fill="hold">
+                                          <p:stCondLst>
+                                            <p:cond delay="0"/>
+                                          </p:stCondLst>
+                                        </p:cTn>
+                                        <p:tgtEl>
+                                          <p:spTgt spid="3">
+                                            <p:txEl>
+                                              <p:pRg st="6" end="6"/>
+                                            </p:txEl>
+                                          </p:spTgt>
+                                        </p:tgtEl>
+                                        <p:attrNameLst>
+                                          <p:attrName>style.visibility</p:attrName>
+                                        </p:attrNameLst>
+                                      </p:cBhvr>
+                                      <p:to>
+                                        <p:strVal val="visible"/>
+                                      </p:to>
+                                    </p:set>
+                                    <p:anim calcmode="lin" valueType="num">
+                                      <p:cBhvr additive="base">
+                                        <p:cTn id="50" dur="500" fill="hold"/>
+                                        <p:tgtEl>
+                                          <p:spTgt spid="3">
+                                            <p:txEl>
+                                              <p:pRg st="6" end="6"/>
+                                            </p:txEl>
+                                          </p:spTgt>
+                                        </p:tgtEl>
+                                        <p:attrNameLst>
+                                          <p:attrName>ppt_x</p:attrName>
+                                        </p:attrNameLst>
+                                      </p:cBhvr>
+                                      <p:tavLst>
+                                        <p:tav tm="0">
+                                          <p:val>
+                                            <p:strVal val="#ppt_x"/>
+                                          </p:val>
+                                        </p:tav>
+                                        <p:tav tm="100000">
+                                          <p:val>
+                                            <p:strVal val="#ppt_x"/>
+                                          </p:val>
+                                        </p:tav>
+                                      </p:tavLst>
+                                    </p:anim>
+                                    <p:anim calcmode="lin" valueType="num">
+                                      <p:cBhvr additive="base">
+                                        <p:cTn id="51" dur="500" fill="hold"/>
+                                        <p:tgtEl>
+                                          <p:spTgt spid="3">
+                                            <p:txEl>
+                                              <p:pRg st="6" end="6"/>
+                                            </p:txEl>
+                                          </p:spTgt>
+                                        </p:tgtEl>
+                                        <p:attrNameLst>
+                                          <p:attrName>ppt_y</p:attrName>
+                                        </p:attrNameLst>
+                                      </p:cBhvr>
+                                      <p:tavLst>
+                                        <p:tav tm="0">
+                                          <p:val>
+                                            <p:strVal val="1+#ppt_h/2"/>
+                                          </p:val>
+                                        </p:tav>
+                                        <p:tav tm="100000">
+                                          <p:val>
+                                            <p:strVal val="#ppt_y"/>
+                                          </p:val>
+                                        </p:tav>
+                                      </p:tavLst>
+                                    </p:anim>
+                                  </p:childTnLst>
+                                </p:cTn>
+                              </p:par>
+                            </p:childTnLst>
+                          </p:cTn>
+                        </p:par>
+                      </p:childTnLst>
+                    </p:cTn>
+                  </p:par>
                 </p:childTnLst>
               </p:cTn>
               <p:prevCondLst>
@@ -4093,7 +5515,7 @@
 </p:sld>
 </file>
 
-<file path=ppt/slides/slide2.xml><?xml version="1.0" encoding="utf-8"?>
+<file path=ppt/slides/slide3.xml><?xml version="1.0" encoding="utf-8"?>
 <p:sld xmlns:a="http://schemas.openxmlformats.org/drawingml/2006/main" xmlns:r="http://schemas.openxmlformats.org/officeDocument/2006/relationships" xmlns:p="http://schemas.openxmlformats.org/presentationml/2006/main">
   <p:cSld>
     <p:bg>
@@ -5389,7 +6811,7 @@
 </p:sld>
 </file>
 
-<file path=ppt/slides/slide3.xml><?xml version="1.0" encoding="utf-8"?>
+<file path=ppt/slides/slide4.xml><?xml version="1.0" encoding="utf-8"?>
 <p:sld xmlns:a="http://schemas.openxmlformats.org/drawingml/2006/main" xmlns:r="http://schemas.openxmlformats.org/officeDocument/2006/relationships" xmlns:p="http://schemas.openxmlformats.org/presentationml/2006/main">
   <p:cSld>
     <p:bg>
@@ -7191,7 +8613,7 @@
 </p:sld>
 </file>
 
-<file path=ppt/slides/slide4.xml><?xml version="1.0" encoding="utf-8"?>
+<file path=ppt/slides/slide5.xml><?xml version="1.0" encoding="utf-8"?>
 <p:sld xmlns:a="http://schemas.openxmlformats.org/drawingml/2006/main" xmlns:r="http://schemas.openxmlformats.org/officeDocument/2006/relationships" xmlns:p="http://schemas.openxmlformats.org/presentationml/2006/main">
   <p:cSld>
     <p:bg>
@@ -8129,7 +9551,7 @@
 </p:sld>
 </file>
 
-<file path=ppt/slides/slide5.xml><?xml version="1.0" encoding="utf-8"?>
+<file path=ppt/slides/slide6.xml><?xml version="1.0" encoding="utf-8"?>
 <p:sld xmlns:a="http://schemas.openxmlformats.org/drawingml/2006/main" xmlns:r="http://schemas.openxmlformats.org/officeDocument/2006/relationships" xmlns:p="http://schemas.openxmlformats.org/presentationml/2006/main">
   <p:cSld>
     <p:bg>
@@ -9908,7 +11330,7 @@
 </p:sld>
 </file>
 
-<file path=ppt/slides/slide6.xml><?xml version="1.0" encoding="utf-8"?>
+<file path=ppt/slides/slide7.xml><?xml version="1.0" encoding="utf-8"?>
 <p:sld xmlns:a="http://schemas.openxmlformats.org/drawingml/2006/main" xmlns:r="http://schemas.openxmlformats.org/officeDocument/2006/relationships" xmlns:p="http://schemas.openxmlformats.org/presentationml/2006/main">
   <p:cSld>
     <p:bg>

</xml_diff>